<commit_message>
Some updates to the ppt.
</commit_message>
<xml_diff>
--- a/DP01_Into_And_Adapter_Pattern.pptx
+++ b/DP01_Into_And_Adapter_Pattern.pptx
@@ -4528,25 +4528,6 @@
       </p:sp>
       <p:sp>
         <p:nvSpPr>
-          <p:cNvPr id="3" name="Tartalom helye 2"/>
-          <p:cNvSpPr>
-            <a:spLocks noGrp="1"/>
-          </p:cNvSpPr>
-          <p:nvPr>
-            <p:ph idx="1"/>
-          </p:nvPr>
-        </p:nvSpPr>
-        <p:spPr/>
-        <p:txBody>
-          <a:bodyPr/>
-          <a:lstStyle/>
-          <a:p>
-            <a:endParaRPr lang="hu-HU" dirty="0"/>
-          </a:p>
-        </p:txBody>
-      </p:sp>
-      <p:sp>
-        <p:nvSpPr>
           <p:cNvPr id="5" name="Slide Number Placeholder 4"/>
           <p:cNvSpPr>
             <a:spLocks noGrp="1"/>
@@ -5627,6 +5608,13 @@
   <p:clrMapOvr>
     <a:masterClrMapping/>
   </p:clrMapOvr>
+  <p:timing>
+    <p:tnLst>
+      <p:par>
+        <p:cTn id="1" dur="indefinite" restart="never" nodeType="tmRoot"/>
+      </p:par>
+    </p:tnLst>
+  </p:timing>
 </p:sld>
 </file>
 
@@ -6124,6 +6112,13 @@
   <p:clrMapOvr>
     <a:masterClrMapping/>
   </p:clrMapOvr>
+  <p:timing>
+    <p:tnLst>
+      <p:par>
+        <p:cTn id="1" dur="indefinite" restart="never" nodeType="tmRoot"/>
+      </p:par>
+    </p:tnLst>
+  </p:timing>
 </p:sld>
 </file>
 
@@ -6440,8 +6435,16 @@
           <a:p>
             <a:pPr lvl="1"/>
             <a:r>
-              <a:rPr lang="sv-SE" dirty="0" err="1"/>
+              <a:rPr lang="sv-SE" dirty="0" smtClean="0"/>
               <a:t>Applicability</a:t>
+            </a:r>
+            <a:endParaRPr lang="hu-HU" dirty="0" smtClean="0"/>
+          </a:p>
+          <a:p>
+            <a:pPr lvl="1"/>
+            <a:r>
+              <a:rPr lang="hu-HU" dirty="0" err="1" smtClean="0"/>
+              <a:t>Intent</a:t>
             </a:r>
             <a:endParaRPr lang="sv-SE" dirty="0"/>
           </a:p>
@@ -6455,16 +6458,16 @@
           <a:p>
             <a:pPr lvl="1"/>
             <a:r>
-              <a:rPr lang="sv-SE" dirty="0" err="1"/>
-              <a:t>Code</a:t>
-            </a:r>
-            <a:r>
               <a:rPr lang="sv-SE" dirty="0"/>
-              <a:t> </a:t>
-            </a:r>
-            <a:r>
-              <a:rPr lang="sv-SE" dirty="0" err="1"/>
+              <a:t>Code </a:t>
+            </a:r>
+            <a:r>
+              <a:rPr lang="sv-SE" dirty="0" smtClean="0"/>
               <a:t>example</a:t>
+            </a:r>
+            <a:r>
+              <a:rPr lang="hu-HU" dirty="0" smtClean="0"/>
+              <a:t>s</a:t>
             </a:r>
             <a:endParaRPr lang="sv-SE" dirty="0"/>
           </a:p>

</xml_diff>

<commit_message>
PPT has been modified
</commit_message>
<xml_diff>
--- a/DP01_Into_And_Adapter_Pattern.pptx
+++ b/DP01_Into_And_Adapter_Pattern.pptx
@@ -5,7 +5,7 @@
     <p:sldMasterId id="2147483660" r:id="rId1"/>
   </p:sldMasterIdLst>
   <p:notesMasterIdLst>
-    <p:notesMasterId r:id="rId28"/>
+    <p:notesMasterId r:id="rId30"/>
   </p:notesMasterIdLst>
   <p:sldIdLst>
     <p:sldId id="256" r:id="rId2"/>
@@ -30,10 +30,12 @@
     <p:sldId id="281" r:id="rId21"/>
     <p:sldId id="275" r:id="rId22"/>
     <p:sldId id="263" r:id="rId23"/>
-    <p:sldId id="276" r:id="rId24"/>
-    <p:sldId id="277" r:id="rId25"/>
-    <p:sldId id="278" r:id="rId26"/>
-    <p:sldId id="264" r:id="rId27"/>
+    <p:sldId id="264" r:id="rId24"/>
+    <p:sldId id="276" r:id="rId25"/>
+    <p:sldId id="277" r:id="rId26"/>
+    <p:sldId id="284" r:id="rId27"/>
+    <p:sldId id="278" r:id="rId28"/>
+    <p:sldId id="285" r:id="rId29"/>
   </p:sldIdLst>
   <p:sldSz cx="12192000" cy="6858000"/>
   <p:notesSz cx="6858000" cy="9144000"/>
@@ -1486,7 +1488,7 @@
           <a:p>
             <a:fld id="{27C334D5-55AD-42ED-8491-40C1A78BB94C}" type="slidenum">
               <a:rPr lang="hu-HU" smtClean="0"/>
-              <a:t>23</a:t>
+              <a:t>24</a:t>
             </a:fld>
             <a:endParaRPr lang="hu-HU"/>
           </a:p>
@@ -7147,47 +7149,7 @@
           <a:p>
             <a:r>
               <a:rPr lang="hu-HU" dirty="0" err="1"/>
-              <a:t>Some</a:t>
-            </a:r>
-            <a:r>
-              <a:rPr lang="hu-HU" dirty="0"/>
-              <a:t> </a:t>
-            </a:r>
-            <a:r>
-              <a:rPr lang="hu-HU" dirty="0" err="1"/>
-              <a:t>words</a:t>
-            </a:r>
-            <a:r>
-              <a:rPr lang="hu-HU" dirty="0"/>
-              <a:t> </a:t>
-            </a:r>
-            <a:r>
-              <a:rPr lang="hu-HU" dirty="0" err="1"/>
-              <a:t>about</a:t>
-            </a:r>
-            <a:r>
-              <a:rPr lang="hu-HU" dirty="0"/>
-              <a:t> </a:t>
-            </a:r>
-            <a:r>
-              <a:rPr lang="hu-HU" dirty="0" err="1"/>
-              <a:t>the</a:t>
-            </a:r>
-            <a:r>
-              <a:rPr lang="hu-HU" dirty="0"/>
-              <a:t> Open/</a:t>
-            </a:r>
-            <a:r>
-              <a:rPr lang="hu-HU" dirty="0" err="1"/>
-              <a:t>Closed</a:t>
-            </a:r>
-            <a:r>
-              <a:rPr lang="hu-HU" dirty="0"/>
-              <a:t> </a:t>
-            </a:r>
-            <a:r>
-              <a:rPr lang="hu-HU" dirty="0" err="1"/>
-              <a:t>Principle</a:t>
+              <a:t>References</a:t>
             </a:r>
             <a:endParaRPr lang="hu-HU" dirty="0"/>
           </a:p>
@@ -7209,512 +7171,29 @@
           <a:lstStyle/>
           <a:p>
             <a:r>
-              <a:rPr lang="hu-HU" dirty="0"/>
-              <a:t>The Open/ </a:t>
-            </a:r>
-            <a:r>
-              <a:rPr lang="hu-HU" dirty="0" err="1"/>
-              <a:t>Closed</a:t>
-            </a:r>
-            <a:r>
-              <a:rPr lang="hu-HU" dirty="0"/>
-              <a:t> </a:t>
-            </a:r>
-            <a:r>
-              <a:rPr lang="hu-HU" dirty="0" err="1"/>
-              <a:t>Principle</a:t>
-            </a:r>
-            <a:r>
-              <a:rPr lang="hu-HU" dirty="0"/>
-              <a:t> </a:t>
-            </a:r>
-            <a:r>
-              <a:rPr lang="hu-HU" dirty="0" err="1"/>
-              <a:t>states</a:t>
-            </a:r>
-            <a:r>
-              <a:rPr lang="hu-HU" dirty="0"/>
-              <a:t> </a:t>
-            </a:r>
-            <a:r>
-              <a:rPr lang="hu-HU" dirty="0" err="1"/>
-              <a:t>that</a:t>
-            </a:r>
-            <a:r>
-              <a:rPr lang="hu-HU" dirty="0"/>
-              <a:t> software </a:t>
-            </a:r>
-            <a:r>
-              <a:rPr lang="hu-HU" dirty="0" err="1"/>
-              <a:t>entities</a:t>
-            </a:r>
-            <a:r>
-              <a:rPr lang="hu-HU" dirty="0"/>
-              <a:t>(</a:t>
-            </a:r>
-            <a:r>
-              <a:rPr lang="hu-HU" dirty="0" err="1"/>
-              <a:t>classes</a:t>
-            </a:r>
-            <a:r>
-              <a:rPr lang="hu-HU" dirty="0"/>
-              <a:t>, </a:t>
-            </a:r>
-            <a:r>
-              <a:rPr lang="hu-HU" dirty="0" err="1"/>
-              <a:t>modules</a:t>
-            </a:r>
-            <a:r>
-              <a:rPr lang="hu-HU" dirty="0"/>
-              <a:t>, </a:t>
-            </a:r>
-            <a:r>
-              <a:rPr lang="hu-HU" dirty="0" err="1"/>
-              <a:t>functions</a:t>
-            </a:r>
-            <a:r>
-              <a:rPr lang="hu-HU" dirty="0"/>
-              <a:t>,etc.) </a:t>
-            </a:r>
-            <a:r>
-              <a:rPr lang="hu-HU" dirty="0" err="1"/>
-              <a:t>should</a:t>
-            </a:r>
-            <a:r>
-              <a:rPr lang="hu-HU" dirty="0"/>
-              <a:t> be </a:t>
-            </a:r>
-            <a:r>
-              <a:rPr lang="hu-HU" dirty="0" err="1"/>
-              <a:t>open</a:t>
-            </a:r>
-            <a:r>
-              <a:rPr lang="hu-HU" dirty="0"/>
-              <a:t> </a:t>
-            </a:r>
-            <a:r>
-              <a:rPr lang="hu-HU" dirty="0" err="1"/>
-              <a:t>for</a:t>
-            </a:r>
-            <a:r>
-              <a:rPr lang="hu-HU" dirty="0"/>
-              <a:t> </a:t>
-            </a:r>
-            <a:r>
-              <a:rPr lang="hu-HU" dirty="0" err="1"/>
-              <a:t>extension</a:t>
-            </a:r>
-            <a:r>
-              <a:rPr lang="hu-HU" dirty="0"/>
-              <a:t>, </a:t>
-            </a:r>
-            <a:r>
-              <a:rPr lang="hu-HU" dirty="0" err="1"/>
-              <a:t>but</a:t>
-            </a:r>
-            <a:r>
-              <a:rPr lang="hu-HU" dirty="0"/>
-              <a:t> </a:t>
-            </a:r>
-            <a:r>
-              <a:rPr lang="hu-HU" dirty="0" err="1"/>
-              <a:t>closed</a:t>
-            </a:r>
-            <a:r>
-              <a:rPr lang="hu-HU" dirty="0"/>
-              <a:t> </a:t>
-            </a:r>
-            <a:r>
-              <a:rPr lang="hu-HU" dirty="0" err="1"/>
-              <a:t>for</a:t>
-            </a:r>
-            <a:r>
-              <a:rPr lang="hu-HU" dirty="0"/>
-              <a:t> </a:t>
-            </a:r>
-            <a:r>
-              <a:rPr lang="hu-HU" dirty="0" err="1"/>
-              <a:t>modification</a:t>
-            </a:r>
-            <a:r>
-              <a:rPr lang="hu-HU" dirty="0"/>
-              <a:t>.</a:t>
-            </a:r>
-          </a:p>
-          <a:p>
-            <a:r>
-              <a:rPr lang="hu-HU" dirty="0"/>
-              <a:t>Open </a:t>
-            </a:r>
-            <a:r>
-              <a:rPr lang="hu-HU" dirty="0" err="1"/>
-              <a:t>to</a:t>
-            </a:r>
-            <a:r>
-              <a:rPr lang="hu-HU" dirty="0"/>
-              <a:t> </a:t>
-            </a:r>
-            <a:r>
-              <a:rPr lang="hu-HU" dirty="0" err="1"/>
-              <a:t>Extension</a:t>
-            </a:r>
-            <a:r>
-              <a:rPr lang="hu-HU" dirty="0"/>
-              <a:t> – New </a:t>
-            </a:r>
-            <a:r>
-              <a:rPr lang="hu-HU" dirty="0" err="1"/>
-              <a:t>behavior</a:t>
-            </a:r>
-            <a:r>
-              <a:rPr lang="hu-HU" dirty="0"/>
-              <a:t> </a:t>
-            </a:r>
-            <a:r>
-              <a:rPr lang="hu-HU" dirty="0" err="1"/>
-              <a:t>can</a:t>
-            </a:r>
-            <a:r>
-              <a:rPr lang="hu-HU" dirty="0"/>
-              <a:t> be </a:t>
-            </a:r>
-            <a:r>
-              <a:rPr lang="hu-HU" dirty="0" err="1"/>
-              <a:t>added</a:t>
-            </a:r>
-            <a:r>
-              <a:rPr lang="hu-HU" dirty="0"/>
-              <a:t> </a:t>
-            </a:r>
-            <a:r>
-              <a:rPr lang="hu-HU" dirty="0" err="1"/>
-              <a:t>in</a:t>
-            </a:r>
-            <a:r>
-              <a:rPr lang="hu-HU" dirty="0"/>
-              <a:t> </a:t>
-            </a:r>
-            <a:r>
-              <a:rPr lang="hu-HU" dirty="0" err="1"/>
-              <a:t>the</a:t>
-            </a:r>
-            <a:r>
-              <a:rPr lang="hu-HU" dirty="0"/>
-              <a:t> </a:t>
-            </a:r>
-            <a:r>
-              <a:rPr lang="hu-HU" dirty="0" err="1"/>
-              <a:t>future</a:t>
-            </a:r>
+              <a:rPr lang="en-US" dirty="0"/>
+              <a:t>Design Patterns: Elements of Reusable Object-Oriented Software</a:t>
+            </a:r>
+            <a:r>
+              <a:rPr lang="hu-HU" dirty="0"/>
+              <a:t> (1994)</a:t>
+            </a:r>
+            <a:endParaRPr lang="sv-SE" dirty="0"/>
+          </a:p>
+          <a:p>
+            <a:r>
+              <a:rPr lang="hu-HU" dirty="0"/>
+              <a:t>Head First Design Patterns</a:t>
+            </a:r>
+          </a:p>
+          <a:p>
+            <a:r>
+              <a:rPr lang="hu-HU" dirty="0"/>
+              <a:t>https://dzone.com/articles/design-patterns-uncovered-0</a:t>
+            </a:r>
+          </a:p>
+          <a:p>
             <a:endParaRPr lang="hu-HU" dirty="0"/>
-          </a:p>
-          <a:p>
-            <a:r>
-              <a:rPr lang="hu-HU" dirty="0" err="1"/>
-              <a:t>Closed</a:t>
-            </a:r>
-            <a:r>
-              <a:rPr lang="hu-HU" dirty="0"/>
-              <a:t> </a:t>
-            </a:r>
-            <a:r>
-              <a:rPr lang="hu-HU" dirty="0" err="1"/>
-              <a:t>to</a:t>
-            </a:r>
-            <a:r>
-              <a:rPr lang="hu-HU" dirty="0"/>
-              <a:t> </a:t>
-            </a:r>
-            <a:r>
-              <a:rPr lang="hu-HU" dirty="0" err="1"/>
-              <a:t>Modification</a:t>
-            </a:r>
-            <a:r>
-              <a:rPr lang="hu-HU" dirty="0"/>
-              <a:t> – </a:t>
-            </a:r>
-            <a:r>
-              <a:rPr lang="hu-HU" dirty="0" err="1"/>
-              <a:t>Changes</a:t>
-            </a:r>
-            <a:r>
-              <a:rPr lang="hu-HU" dirty="0"/>
-              <a:t> </a:t>
-            </a:r>
-            <a:r>
-              <a:rPr lang="hu-HU" dirty="0" err="1"/>
-              <a:t>to</a:t>
-            </a:r>
-            <a:r>
-              <a:rPr lang="hu-HU" dirty="0"/>
-              <a:t> </a:t>
-            </a:r>
-            <a:r>
-              <a:rPr lang="hu-HU" dirty="0" err="1"/>
-              <a:t>source</a:t>
-            </a:r>
-            <a:r>
-              <a:rPr lang="hu-HU" dirty="0"/>
-              <a:t> </a:t>
-            </a:r>
-            <a:r>
-              <a:rPr lang="hu-HU" dirty="0" err="1"/>
-              <a:t>or</a:t>
-            </a:r>
-            <a:r>
-              <a:rPr lang="hu-HU" dirty="0"/>
-              <a:t> </a:t>
-            </a:r>
-            <a:r>
-              <a:rPr lang="hu-HU" dirty="0" err="1"/>
-              <a:t>binary</a:t>
-            </a:r>
-            <a:r>
-              <a:rPr lang="hu-HU" dirty="0"/>
-              <a:t> </a:t>
-            </a:r>
-            <a:r>
-              <a:rPr lang="hu-HU" dirty="0" err="1"/>
-              <a:t>code</a:t>
-            </a:r>
-            <a:r>
-              <a:rPr lang="hu-HU" dirty="0"/>
-              <a:t> </a:t>
-            </a:r>
-            <a:r>
-              <a:rPr lang="hu-HU" dirty="0" err="1"/>
-              <a:t>are</a:t>
-            </a:r>
-            <a:r>
-              <a:rPr lang="hu-HU" dirty="0"/>
-              <a:t> </a:t>
-            </a:r>
-            <a:r>
-              <a:rPr lang="hu-HU" dirty="0" err="1"/>
-              <a:t>not</a:t>
-            </a:r>
-            <a:r>
-              <a:rPr lang="hu-HU" dirty="0"/>
-              <a:t> </a:t>
-            </a:r>
-            <a:r>
-              <a:rPr lang="hu-HU" dirty="0" err="1"/>
-              <a:t>required</a:t>
-            </a:r>
-            <a:r>
-              <a:rPr lang="hu-HU" dirty="0"/>
-              <a:t>, </a:t>
-            </a:r>
-            <a:r>
-              <a:rPr lang="hu-HU" dirty="0" err="1"/>
-              <a:t>we</a:t>
-            </a:r>
-            <a:r>
-              <a:rPr lang="hu-HU" dirty="0"/>
-              <a:t> </a:t>
-            </a:r>
-            <a:r>
-              <a:rPr lang="hu-HU" dirty="0" err="1"/>
-              <a:t>should</a:t>
-            </a:r>
-            <a:r>
-              <a:rPr lang="hu-HU" dirty="0"/>
-              <a:t> </a:t>
-            </a:r>
-            <a:r>
-              <a:rPr lang="hu-HU" dirty="0" err="1"/>
-              <a:t>not</a:t>
-            </a:r>
-            <a:r>
-              <a:rPr lang="hu-HU" dirty="0"/>
-              <a:t> </a:t>
-            </a:r>
-            <a:r>
-              <a:rPr lang="hu-HU" dirty="0" err="1"/>
-              <a:t>recompile</a:t>
-            </a:r>
-            <a:r>
-              <a:rPr lang="hu-HU" dirty="0"/>
-              <a:t> </a:t>
-            </a:r>
-            <a:r>
-              <a:rPr lang="hu-HU" dirty="0" err="1"/>
-              <a:t>the</a:t>
-            </a:r>
-            <a:r>
-              <a:rPr lang="hu-HU" dirty="0"/>
-              <a:t> </a:t>
-            </a:r>
-            <a:r>
-              <a:rPr lang="hu-HU" dirty="0" err="1"/>
-              <a:t>code</a:t>
-            </a:r>
-            <a:r>
-              <a:rPr lang="hu-HU" dirty="0"/>
-              <a:t> </a:t>
-            </a:r>
-            <a:r>
-              <a:rPr lang="hu-HU" dirty="0" err="1"/>
-              <a:t>to</a:t>
-            </a:r>
-            <a:r>
-              <a:rPr lang="hu-HU" dirty="0"/>
-              <a:t> </a:t>
-            </a:r>
-            <a:r>
-              <a:rPr lang="hu-HU" dirty="0" err="1"/>
-              <a:t>achive</a:t>
-            </a:r>
-            <a:r>
-              <a:rPr lang="hu-HU" dirty="0"/>
-              <a:t> </a:t>
-            </a:r>
-            <a:r>
-              <a:rPr lang="hu-HU" dirty="0" err="1"/>
-              <a:t>this</a:t>
-            </a:r>
-            <a:r>
-              <a:rPr lang="hu-HU" dirty="0"/>
-              <a:t>.</a:t>
-            </a:r>
-          </a:p>
-          <a:p>
-            <a:r>
-              <a:rPr lang="hu-HU" dirty="0" err="1"/>
-              <a:t>Rely</a:t>
-            </a:r>
-            <a:r>
-              <a:rPr lang="hu-HU" dirty="0"/>
-              <a:t> </a:t>
-            </a:r>
-            <a:r>
-              <a:rPr lang="hu-HU" dirty="0" err="1"/>
-              <a:t>on</a:t>
-            </a:r>
-            <a:r>
-              <a:rPr lang="hu-HU" dirty="0"/>
-              <a:t> </a:t>
-            </a:r>
-            <a:r>
-              <a:rPr lang="hu-HU" dirty="0" err="1"/>
-              <a:t>abstractions</a:t>
-            </a:r>
-            <a:r>
-              <a:rPr lang="hu-HU" dirty="0"/>
-              <a:t>(</a:t>
-            </a:r>
-            <a:r>
-              <a:rPr lang="hu-HU" dirty="0" err="1"/>
-              <a:t>Interfaces</a:t>
-            </a:r>
-            <a:r>
-              <a:rPr lang="hu-HU" dirty="0"/>
-              <a:t> and </a:t>
-            </a:r>
-            <a:r>
-              <a:rPr lang="hu-HU" dirty="0" err="1"/>
-              <a:t>Abstract</a:t>
-            </a:r>
-            <a:r>
-              <a:rPr lang="hu-HU" dirty="0"/>
-              <a:t> </a:t>
-            </a:r>
-            <a:r>
-              <a:rPr lang="hu-HU" dirty="0" err="1"/>
-              <a:t>base</a:t>
-            </a:r>
-            <a:r>
-              <a:rPr lang="hu-HU" dirty="0"/>
-              <a:t> </a:t>
-            </a:r>
-            <a:r>
-              <a:rPr lang="hu-HU" dirty="0" err="1"/>
-              <a:t>classes</a:t>
-            </a:r>
-            <a:r>
-              <a:rPr lang="hu-HU" dirty="0"/>
-              <a:t>), </a:t>
-            </a:r>
-            <a:r>
-              <a:rPr lang="hu-HU" dirty="0" err="1"/>
-              <a:t>introducing</a:t>
-            </a:r>
-            <a:r>
-              <a:rPr lang="hu-HU" dirty="0"/>
-              <a:t> </a:t>
-            </a:r>
-            <a:r>
-              <a:rPr lang="hu-HU" dirty="0" err="1"/>
-              <a:t>seams</a:t>
-            </a:r>
-            <a:r>
-              <a:rPr lang="hu-HU" dirty="0"/>
-              <a:t>, </a:t>
-            </a:r>
-            <a:r>
-              <a:rPr lang="hu-HU" dirty="0" err="1"/>
-              <a:t>where</a:t>
-            </a:r>
-            <a:r>
-              <a:rPr lang="hu-HU" dirty="0"/>
-              <a:t> </a:t>
-            </a:r>
-            <a:r>
-              <a:rPr lang="hu-HU" dirty="0" err="1"/>
-              <a:t>we</a:t>
-            </a:r>
-            <a:r>
-              <a:rPr lang="hu-HU" dirty="0"/>
-              <a:t> </a:t>
-            </a:r>
-            <a:r>
-              <a:rPr lang="hu-HU" dirty="0" err="1"/>
-              <a:t>can</a:t>
-            </a:r>
-            <a:r>
-              <a:rPr lang="hu-HU" dirty="0"/>
-              <a:t> </a:t>
-            </a:r>
-            <a:r>
-              <a:rPr lang="hu-HU" dirty="0" err="1"/>
-              <a:t>separate</a:t>
-            </a:r>
-            <a:r>
-              <a:rPr lang="hu-HU" dirty="0"/>
-              <a:t> </a:t>
-            </a:r>
-            <a:r>
-              <a:rPr lang="hu-HU" dirty="0" err="1"/>
-              <a:t>different</a:t>
-            </a:r>
-            <a:r>
-              <a:rPr lang="hu-HU" dirty="0"/>
-              <a:t> </a:t>
-            </a:r>
-            <a:r>
-              <a:rPr lang="hu-HU" dirty="0" err="1"/>
-              <a:t>parts</a:t>
-            </a:r>
-            <a:r>
-              <a:rPr lang="hu-HU" dirty="0"/>
-              <a:t> of </a:t>
-            </a:r>
-            <a:r>
-              <a:rPr lang="hu-HU" dirty="0" err="1"/>
-              <a:t>our</a:t>
-            </a:r>
-            <a:r>
-              <a:rPr lang="hu-HU" dirty="0"/>
-              <a:t> </a:t>
-            </a:r>
-            <a:r>
-              <a:rPr lang="hu-HU" dirty="0" err="1"/>
-              <a:t>application</a:t>
-            </a:r>
-            <a:r>
-              <a:rPr lang="hu-HU" dirty="0"/>
-              <a:t>.</a:t>
-            </a:r>
           </a:p>
         </p:txBody>
       </p:sp>
@@ -7744,7 +7223,7 @@
     </p:spTree>
     <p:extLst>
       <p:ext uri="{BB962C8B-B14F-4D97-AF65-F5344CB8AC3E}">
-        <p14:creationId xmlns:p14="http://schemas.microsoft.com/office/powerpoint/2010/main" val="3415002473"/>
+        <p14:creationId xmlns:p14="http://schemas.microsoft.com/office/powerpoint/2010/main" val="2474760466"/>
       </p:ext>
     </p:extLst>
   </p:cSld>
@@ -7851,17 +7330,47 @@
           <a:p>
             <a:r>
               <a:rPr lang="hu-HU" dirty="0"/>
-              <a:t>You can change by adding new classes.</a:t>
-            </a:r>
-          </a:p>
-          <a:p>
-            <a:r>
-              <a:rPr lang="hu-HU" dirty="0" err="1"/>
-              <a:t>Smaller</a:t>
-            </a:r>
-            <a:r>
-              <a:rPr lang="hu-HU" dirty="0"/>
-              <a:t> </a:t>
+              <a:t>The Open/ </a:t>
+            </a:r>
+            <a:r>
+              <a:rPr lang="hu-HU" dirty="0" err="1"/>
+              <a:t>Closed</a:t>
+            </a:r>
+            <a:r>
+              <a:rPr lang="hu-HU" dirty="0"/>
+              <a:t> </a:t>
+            </a:r>
+            <a:r>
+              <a:rPr lang="hu-HU" dirty="0" err="1"/>
+              <a:t>Principle</a:t>
+            </a:r>
+            <a:r>
+              <a:rPr lang="hu-HU" dirty="0"/>
+              <a:t> </a:t>
+            </a:r>
+            <a:r>
+              <a:rPr lang="hu-HU" dirty="0" err="1"/>
+              <a:t>states</a:t>
+            </a:r>
+            <a:r>
+              <a:rPr lang="hu-HU" dirty="0"/>
+              <a:t> </a:t>
+            </a:r>
+            <a:r>
+              <a:rPr lang="hu-HU" dirty="0" err="1"/>
+              <a:t>that</a:t>
+            </a:r>
+            <a:r>
+              <a:rPr lang="hu-HU" dirty="0"/>
+              <a:t> software </a:t>
+            </a:r>
+            <a:r>
+              <a:rPr lang="hu-HU" dirty="0" err="1"/>
+              <a:t>entities</a:t>
+            </a:r>
+            <a:r>
+              <a:rPr lang="hu-HU" dirty="0"/>
+              <a:t>(</a:t>
             </a:r>
             <a:r>
               <a:rPr lang="hu-HU" dirty="0" err="1"/>
@@ -7873,39 +7382,133 @@
             </a:r>
             <a:r>
               <a:rPr lang="hu-HU" dirty="0" err="1"/>
-              <a:t>which</a:t>
-            </a:r>
-            <a:r>
-              <a:rPr lang="hu-HU" dirty="0"/>
-              <a:t> has </a:t>
-            </a:r>
-            <a:r>
-              <a:rPr lang="hu-HU" dirty="0" err="1"/>
-              <a:t>only</a:t>
-            </a:r>
-            <a:r>
-              <a:rPr lang="hu-HU" dirty="0"/>
-              <a:t> </a:t>
-            </a:r>
-            <a:r>
-              <a:rPr lang="hu-HU" dirty="0" err="1"/>
-              <a:t>one</a:t>
-            </a:r>
-            <a:r>
-              <a:rPr lang="hu-HU" dirty="0"/>
-              <a:t> </a:t>
-            </a:r>
-            <a:r>
-              <a:rPr lang="hu-HU" dirty="0" err="1"/>
-              <a:t>job</a:t>
-            </a:r>
-            <a:r>
-              <a:rPr lang="hu-HU" dirty="0"/>
-              <a:t> (</a:t>
-            </a:r>
-            <a:r>
-              <a:rPr lang="hu-HU" dirty="0" err="1"/>
-              <a:t>following</a:t>
+              <a:t>modules</a:t>
+            </a:r>
+            <a:r>
+              <a:rPr lang="hu-HU" dirty="0"/>
+              <a:t>, </a:t>
+            </a:r>
+            <a:r>
+              <a:rPr lang="hu-HU" dirty="0" err="1"/>
+              <a:t>functions</a:t>
+            </a:r>
+            <a:r>
+              <a:rPr lang="hu-HU" dirty="0"/>
+              <a:t>,etc.) </a:t>
+            </a:r>
+            <a:r>
+              <a:rPr lang="hu-HU" dirty="0" err="1"/>
+              <a:t>should</a:t>
+            </a:r>
+            <a:r>
+              <a:rPr lang="hu-HU" dirty="0"/>
+              <a:t> be </a:t>
+            </a:r>
+            <a:r>
+              <a:rPr lang="hu-HU" dirty="0" err="1"/>
+              <a:t>open</a:t>
+            </a:r>
+            <a:r>
+              <a:rPr lang="hu-HU" dirty="0"/>
+              <a:t> </a:t>
+            </a:r>
+            <a:r>
+              <a:rPr lang="hu-HU" dirty="0" err="1"/>
+              <a:t>for</a:t>
+            </a:r>
+            <a:r>
+              <a:rPr lang="hu-HU" dirty="0"/>
+              <a:t> </a:t>
+            </a:r>
+            <a:r>
+              <a:rPr lang="hu-HU" dirty="0" err="1"/>
+              <a:t>extension</a:t>
+            </a:r>
+            <a:r>
+              <a:rPr lang="hu-HU" dirty="0"/>
+              <a:t>, </a:t>
+            </a:r>
+            <a:r>
+              <a:rPr lang="hu-HU" dirty="0" err="1"/>
+              <a:t>but</a:t>
+            </a:r>
+            <a:r>
+              <a:rPr lang="hu-HU" dirty="0"/>
+              <a:t> </a:t>
+            </a:r>
+            <a:r>
+              <a:rPr lang="hu-HU" dirty="0" err="1"/>
+              <a:t>closed</a:t>
+            </a:r>
+            <a:r>
+              <a:rPr lang="hu-HU" dirty="0"/>
+              <a:t> </a:t>
+            </a:r>
+            <a:r>
+              <a:rPr lang="hu-HU" dirty="0" err="1"/>
+              <a:t>for</a:t>
+            </a:r>
+            <a:r>
+              <a:rPr lang="hu-HU" dirty="0"/>
+              <a:t> </a:t>
+            </a:r>
+            <a:r>
+              <a:rPr lang="hu-HU" dirty="0" err="1"/>
+              <a:t>modification</a:t>
+            </a:r>
+            <a:r>
+              <a:rPr lang="hu-HU" dirty="0"/>
+              <a:t>.</a:t>
+            </a:r>
+          </a:p>
+          <a:p>
+            <a:r>
+              <a:rPr lang="hu-HU" dirty="0"/>
+              <a:t>Open </a:t>
+            </a:r>
+            <a:r>
+              <a:rPr lang="hu-HU" dirty="0" err="1"/>
+              <a:t>to</a:t>
+            </a:r>
+            <a:r>
+              <a:rPr lang="hu-HU" dirty="0"/>
+              <a:t> </a:t>
+            </a:r>
+            <a:r>
+              <a:rPr lang="hu-HU" dirty="0" err="1"/>
+              <a:t>Extension</a:t>
+            </a:r>
+            <a:r>
+              <a:rPr lang="hu-HU" dirty="0"/>
+              <a:t> – New </a:t>
+            </a:r>
+            <a:r>
+              <a:rPr lang="hu-HU" dirty="0" err="1"/>
+              <a:t>behavior</a:t>
+            </a:r>
+            <a:r>
+              <a:rPr lang="hu-HU" dirty="0"/>
+              <a:t> </a:t>
+            </a:r>
+            <a:r>
+              <a:rPr lang="hu-HU" dirty="0" err="1"/>
+              <a:t>can</a:t>
+            </a:r>
+            <a:r>
+              <a:rPr lang="hu-HU" dirty="0"/>
+              <a:t> be </a:t>
+            </a:r>
+            <a:r>
+              <a:rPr lang="hu-HU" dirty="0" err="1"/>
+              <a:t>added</a:t>
+            </a:r>
+            <a:r>
+              <a:rPr lang="hu-HU" dirty="0"/>
+              <a:t> </a:t>
+            </a:r>
+            <a:r>
+              <a:rPr lang="hu-HU" dirty="0" err="1"/>
+              <a:t>in</a:t>
             </a:r>
             <a:r>
               <a:rPr lang="hu-HU" dirty="0"/>
@@ -7921,33 +7524,14 @@
             </a:r>
             <a:r>
               <a:rPr lang="hu-HU" dirty="0" err="1"/>
-              <a:t>Single</a:t>
-            </a:r>
-            <a:r>
-              <a:rPr lang="hu-HU" dirty="0"/>
-              <a:t> </a:t>
-            </a:r>
-            <a:r>
-              <a:rPr lang="hu-HU" dirty="0" err="1"/>
-              <a:t>Responsibility</a:t>
-            </a:r>
-            <a:r>
-              <a:rPr lang="hu-HU" dirty="0"/>
-              <a:t> </a:t>
-            </a:r>
-            <a:r>
-              <a:rPr lang="hu-HU" dirty="0" err="1"/>
-              <a:t>principle</a:t>
-            </a:r>
-            <a:r>
-              <a:rPr lang="hu-HU" dirty="0"/>
-              <a:t>)</a:t>
-            </a:r>
-          </a:p>
-          <a:p>
-            <a:r>
-              <a:rPr lang="hu-HU" dirty="0" err="1"/>
-              <a:t>Easy</a:t>
+              <a:t>future</a:t>
+            </a:r>
+            <a:endParaRPr lang="hu-HU" dirty="0"/>
+          </a:p>
+          <a:p>
+            <a:r>
+              <a:rPr lang="hu-HU" dirty="0" err="1"/>
+              <a:t>Closed</a:t>
             </a:r>
             <a:r>
               <a:rPr lang="hu-HU" dirty="0"/>
@@ -7959,11 +7543,205 @@
             </a:r>
             <a:r>
               <a:rPr lang="hu-HU" dirty="0"/>
-              <a:t> test </a:t>
-            </a:r>
-            <a:r>
-              <a:rPr lang="hu-HU" dirty="0" err="1"/>
-              <a:t>new</a:t>
+              <a:t> </a:t>
+            </a:r>
+            <a:r>
+              <a:rPr lang="hu-HU" dirty="0" err="1"/>
+              <a:t>Modification</a:t>
+            </a:r>
+            <a:r>
+              <a:rPr lang="hu-HU" dirty="0"/>
+              <a:t> – </a:t>
+            </a:r>
+            <a:r>
+              <a:rPr lang="hu-HU" dirty="0" err="1"/>
+              <a:t>Changes</a:t>
+            </a:r>
+            <a:r>
+              <a:rPr lang="hu-HU" dirty="0"/>
+              <a:t> </a:t>
+            </a:r>
+            <a:r>
+              <a:rPr lang="hu-HU" dirty="0" err="1"/>
+              <a:t>to</a:t>
+            </a:r>
+            <a:r>
+              <a:rPr lang="hu-HU" dirty="0"/>
+              <a:t> </a:t>
+            </a:r>
+            <a:r>
+              <a:rPr lang="hu-HU" dirty="0" err="1"/>
+              <a:t>source</a:t>
+            </a:r>
+            <a:r>
+              <a:rPr lang="hu-HU" dirty="0"/>
+              <a:t> </a:t>
+            </a:r>
+            <a:r>
+              <a:rPr lang="hu-HU" dirty="0" err="1"/>
+              <a:t>or</a:t>
+            </a:r>
+            <a:r>
+              <a:rPr lang="hu-HU" dirty="0"/>
+              <a:t> </a:t>
+            </a:r>
+            <a:r>
+              <a:rPr lang="hu-HU" dirty="0" err="1"/>
+              <a:t>binary</a:t>
+            </a:r>
+            <a:r>
+              <a:rPr lang="hu-HU" dirty="0"/>
+              <a:t> </a:t>
+            </a:r>
+            <a:r>
+              <a:rPr lang="hu-HU" dirty="0" err="1"/>
+              <a:t>code</a:t>
+            </a:r>
+            <a:r>
+              <a:rPr lang="hu-HU" dirty="0"/>
+              <a:t> </a:t>
+            </a:r>
+            <a:r>
+              <a:rPr lang="hu-HU" dirty="0" err="1"/>
+              <a:t>are</a:t>
+            </a:r>
+            <a:r>
+              <a:rPr lang="hu-HU" dirty="0"/>
+              <a:t> </a:t>
+            </a:r>
+            <a:r>
+              <a:rPr lang="hu-HU" dirty="0" err="1"/>
+              <a:t>not</a:t>
+            </a:r>
+            <a:r>
+              <a:rPr lang="hu-HU" dirty="0"/>
+              <a:t> </a:t>
+            </a:r>
+            <a:r>
+              <a:rPr lang="hu-HU" dirty="0" err="1"/>
+              <a:t>required</a:t>
+            </a:r>
+            <a:r>
+              <a:rPr lang="hu-HU" dirty="0"/>
+              <a:t>, </a:t>
+            </a:r>
+            <a:r>
+              <a:rPr lang="hu-HU" dirty="0" err="1"/>
+              <a:t>we</a:t>
+            </a:r>
+            <a:r>
+              <a:rPr lang="hu-HU" dirty="0"/>
+              <a:t> </a:t>
+            </a:r>
+            <a:r>
+              <a:rPr lang="hu-HU" dirty="0" err="1"/>
+              <a:t>should</a:t>
+            </a:r>
+            <a:r>
+              <a:rPr lang="hu-HU" dirty="0"/>
+              <a:t> </a:t>
+            </a:r>
+            <a:r>
+              <a:rPr lang="hu-HU" dirty="0" err="1"/>
+              <a:t>not</a:t>
+            </a:r>
+            <a:r>
+              <a:rPr lang="hu-HU" dirty="0"/>
+              <a:t> </a:t>
+            </a:r>
+            <a:r>
+              <a:rPr lang="hu-HU" dirty="0" err="1"/>
+              <a:t>recompile</a:t>
+            </a:r>
+            <a:r>
+              <a:rPr lang="hu-HU" dirty="0"/>
+              <a:t> </a:t>
+            </a:r>
+            <a:r>
+              <a:rPr lang="hu-HU" dirty="0" err="1"/>
+              <a:t>the</a:t>
+            </a:r>
+            <a:r>
+              <a:rPr lang="hu-HU" dirty="0"/>
+              <a:t> </a:t>
+            </a:r>
+            <a:r>
+              <a:rPr lang="hu-HU" dirty="0" err="1"/>
+              <a:t>code</a:t>
+            </a:r>
+            <a:r>
+              <a:rPr lang="hu-HU" dirty="0"/>
+              <a:t> </a:t>
+            </a:r>
+            <a:r>
+              <a:rPr lang="hu-HU" dirty="0" err="1"/>
+              <a:t>to</a:t>
+            </a:r>
+            <a:r>
+              <a:rPr lang="hu-HU" dirty="0"/>
+              <a:t> </a:t>
+            </a:r>
+            <a:r>
+              <a:rPr lang="hu-HU" dirty="0" err="1"/>
+              <a:t>achive</a:t>
+            </a:r>
+            <a:r>
+              <a:rPr lang="hu-HU" dirty="0"/>
+              <a:t> </a:t>
+            </a:r>
+            <a:r>
+              <a:rPr lang="hu-HU" dirty="0" err="1"/>
+              <a:t>this</a:t>
+            </a:r>
+            <a:r>
+              <a:rPr lang="hu-HU" dirty="0"/>
+              <a:t>.</a:t>
+            </a:r>
+          </a:p>
+          <a:p>
+            <a:r>
+              <a:rPr lang="hu-HU" dirty="0" err="1"/>
+              <a:t>Rely</a:t>
+            </a:r>
+            <a:r>
+              <a:rPr lang="hu-HU" dirty="0"/>
+              <a:t> </a:t>
+            </a:r>
+            <a:r>
+              <a:rPr lang="hu-HU" dirty="0" err="1"/>
+              <a:t>on</a:t>
+            </a:r>
+            <a:r>
+              <a:rPr lang="hu-HU" dirty="0"/>
+              <a:t> </a:t>
+            </a:r>
+            <a:r>
+              <a:rPr lang="hu-HU" dirty="0" err="1"/>
+              <a:t>abstractions</a:t>
+            </a:r>
+            <a:r>
+              <a:rPr lang="hu-HU" dirty="0"/>
+              <a:t>(</a:t>
+            </a:r>
+            <a:r>
+              <a:rPr lang="hu-HU" dirty="0" err="1"/>
+              <a:t>Interfaces</a:t>
+            </a:r>
+            <a:r>
+              <a:rPr lang="hu-HU" dirty="0"/>
+              <a:t> and </a:t>
+            </a:r>
+            <a:r>
+              <a:rPr lang="hu-HU" dirty="0" err="1"/>
+              <a:t>Abstract</a:t>
+            </a:r>
+            <a:r>
+              <a:rPr lang="hu-HU" dirty="0"/>
+              <a:t> </a:t>
+            </a:r>
+            <a:r>
+              <a:rPr lang="hu-HU" dirty="0" err="1"/>
+              <a:t>base</a:t>
             </a:r>
             <a:r>
               <a:rPr lang="hu-HU" dirty="0"/>
@@ -7975,145 +7753,87 @@
             </a:r>
             <a:r>
               <a:rPr lang="hu-HU" dirty="0"/>
+              <a:t>), </a:t>
+            </a:r>
+            <a:r>
+              <a:rPr lang="hu-HU" dirty="0" err="1"/>
+              <a:t>introducing</a:t>
+            </a:r>
+            <a:r>
+              <a:rPr lang="hu-HU" dirty="0"/>
+              <a:t> </a:t>
+            </a:r>
+            <a:r>
+              <a:rPr lang="hu-HU" dirty="0" err="1"/>
+              <a:t>seams</a:t>
+            </a:r>
+            <a:r>
+              <a:rPr lang="hu-HU" dirty="0"/>
               <a:t>, </a:t>
             </a:r>
             <a:r>
               <a:rPr lang="hu-HU" dirty="0" err="1"/>
-              <a:t>since</a:t>
-            </a:r>
-            <a:r>
-              <a:rPr lang="hu-HU" dirty="0"/>
-              <a:t>:</a:t>
-            </a:r>
-          </a:p>
-          <a:p>
-            <a:pPr lvl="1"/>
-            <a:r>
-              <a:rPr lang="hu-HU" dirty="0" err="1"/>
-              <a:t>Nothing</a:t>
-            </a:r>
-            <a:r>
-              <a:rPr lang="hu-HU" dirty="0"/>
-              <a:t> </a:t>
-            </a:r>
-            <a:r>
-              <a:rPr lang="hu-HU" dirty="0" err="1"/>
-              <a:t>depends</a:t>
-            </a:r>
-            <a:r>
-              <a:rPr lang="hu-HU" dirty="0"/>
-              <a:t> </a:t>
-            </a:r>
-            <a:r>
-              <a:rPr lang="hu-HU" dirty="0" err="1"/>
-              <a:t>on</a:t>
-            </a:r>
-            <a:r>
-              <a:rPr lang="hu-HU" dirty="0"/>
-              <a:t> </a:t>
-            </a:r>
-            <a:r>
-              <a:rPr lang="hu-HU" dirty="0" err="1"/>
-              <a:t>new</a:t>
-            </a:r>
-            <a:r>
-              <a:rPr lang="hu-HU" dirty="0"/>
-              <a:t> </a:t>
-            </a:r>
-            <a:r>
-              <a:rPr lang="hu-HU" dirty="0" err="1"/>
-              <a:t>classes</a:t>
+              <a:t>where</a:t>
+            </a:r>
+            <a:r>
+              <a:rPr lang="hu-HU" dirty="0"/>
+              <a:t> </a:t>
+            </a:r>
+            <a:r>
+              <a:rPr lang="hu-HU" dirty="0" err="1"/>
+              <a:t>we</a:t>
+            </a:r>
+            <a:r>
+              <a:rPr lang="hu-HU" dirty="0"/>
+              <a:t> </a:t>
+            </a:r>
+            <a:r>
+              <a:rPr lang="hu-HU" dirty="0" err="1"/>
+              <a:t>can</a:t>
+            </a:r>
+            <a:r>
+              <a:rPr lang="hu-HU" dirty="0"/>
+              <a:t> </a:t>
+            </a:r>
+            <a:r>
+              <a:rPr lang="hu-HU" dirty="0" err="1"/>
+              <a:t>separate</a:t>
+            </a:r>
+            <a:r>
+              <a:rPr lang="hu-HU" dirty="0"/>
+              <a:t> </a:t>
+            </a:r>
+            <a:r>
+              <a:rPr lang="hu-HU" dirty="0" err="1"/>
+              <a:t>different</a:t>
+            </a:r>
+            <a:r>
+              <a:rPr lang="hu-HU" dirty="0"/>
+              <a:t> </a:t>
+            </a:r>
+            <a:r>
+              <a:rPr lang="hu-HU" dirty="0" err="1"/>
+              <a:t>parts</a:t>
+            </a:r>
+            <a:r>
+              <a:rPr lang="hu-HU" dirty="0"/>
+              <a:t> of </a:t>
+            </a:r>
+            <a:r>
+              <a:rPr lang="hu-HU" dirty="0" err="1"/>
+              <a:t>our</a:t>
+            </a:r>
+            <a:r>
+              <a:rPr lang="hu-HU" dirty="0"/>
+              <a:t> </a:t>
+            </a:r>
+            <a:r>
+              <a:rPr lang="hu-HU" dirty="0" err="1"/>
+              <a:t>application</a:t>
             </a:r>
             <a:r>
               <a:rPr lang="hu-HU" dirty="0"/>
               <a:t>.</a:t>
-            </a:r>
-          </a:p>
-          <a:p>
-            <a:pPr lvl="1"/>
-            <a:r>
-              <a:rPr lang="hu-HU" dirty="0"/>
-              <a:t>New </a:t>
-            </a:r>
-            <a:r>
-              <a:rPr lang="hu-HU" dirty="0" err="1"/>
-              <a:t>classes</a:t>
-            </a:r>
-            <a:r>
-              <a:rPr lang="hu-HU" dirty="0"/>
-              <a:t> </a:t>
-            </a:r>
-            <a:r>
-              <a:rPr lang="hu-HU" dirty="0" err="1"/>
-              <a:t>have</a:t>
-            </a:r>
-            <a:r>
-              <a:rPr lang="hu-HU" dirty="0"/>
-              <a:t> no </a:t>
-            </a:r>
-            <a:r>
-              <a:rPr lang="hu-HU" dirty="0" err="1"/>
-              <a:t>legacy</a:t>
-            </a:r>
-            <a:r>
-              <a:rPr lang="hu-HU" dirty="0"/>
-              <a:t> </a:t>
-            </a:r>
-            <a:r>
-              <a:rPr lang="hu-HU" dirty="0" err="1"/>
-              <a:t>coupling</a:t>
-            </a:r>
-            <a:r>
-              <a:rPr lang="hu-HU" dirty="0"/>
-              <a:t> </a:t>
-            </a:r>
-            <a:r>
-              <a:rPr lang="hu-HU" dirty="0" err="1"/>
-              <a:t>to</a:t>
-            </a:r>
-            <a:r>
-              <a:rPr lang="hu-HU" dirty="0"/>
-              <a:t> </a:t>
-            </a:r>
-            <a:r>
-              <a:rPr lang="hu-HU" dirty="0" err="1"/>
-              <a:t>make</a:t>
-            </a:r>
-            <a:r>
-              <a:rPr lang="hu-HU" dirty="0"/>
-              <a:t> </a:t>
-            </a:r>
-            <a:r>
-              <a:rPr lang="hu-HU" dirty="0" err="1"/>
-              <a:t>them</a:t>
-            </a:r>
-            <a:r>
-              <a:rPr lang="hu-HU" dirty="0"/>
-              <a:t> </a:t>
-            </a:r>
-            <a:r>
-              <a:rPr lang="hu-HU" dirty="0" err="1"/>
-              <a:t>hard</a:t>
-            </a:r>
-            <a:r>
-              <a:rPr lang="hu-HU" dirty="0"/>
-              <a:t> </a:t>
-            </a:r>
-            <a:r>
-              <a:rPr lang="hu-HU" dirty="0" err="1"/>
-              <a:t>to</a:t>
-            </a:r>
-            <a:r>
-              <a:rPr lang="hu-HU" dirty="0"/>
-              <a:t> design </a:t>
-            </a:r>
-            <a:r>
-              <a:rPr lang="hu-HU" dirty="0" err="1"/>
-              <a:t>or</a:t>
-            </a:r>
-            <a:r>
-              <a:rPr lang="hu-HU" dirty="0"/>
-              <a:t> test. </a:t>
             </a:r>
           </a:p>
         </p:txBody>
@@ -8144,7 +7864,7 @@
     </p:spTree>
     <p:extLst>
       <p:ext uri="{BB962C8B-B14F-4D97-AF65-F5344CB8AC3E}">
-        <p14:creationId xmlns:p14="http://schemas.microsoft.com/office/powerpoint/2010/main" val="1216626679"/>
+        <p14:creationId xmlns:p14="http://schemas.microsoft.com/office/powerpoint/2010/main" val="3415002473"/>
       </p:ext>
     </p:extLst>
   </p:cSld>
@@ -8188,7 +7908,166 @@
           <a:p>
             <a:r>
               <a:rPr lang="hu-HU" dirty="0" err="1"/>
-              <a:t>Approaches</a:t>
+              <a:t>Some</a:t>
+            </a:r>
+            <a:r>
+              <a:rPr lang="hu-HU" dirty="0"/>
+              <a:t> </a:t>
+            </a:r>
+            <a:r>
+              <a:rPr lang="hu-HU" dirty="0" err="1"/>
+              <a:t>words</a:t>
+            </a:r>
+            <a:r>
+              <a:rPr lang="hu-HU" dirty="0"/>
+              <a:t> </a:t>
+            </a:r>
+            <a:r>
+              <a:rPr lang="hu-HU" dirty="0" err="1"/>
+              <a:t>about</a:t>
+            </a:r>
+            <a:r>
+              <a:rPr lang="hu-HU" dirty="0"/>
+              <a:t> </a:t>
+            </a:r>
+            <a:r>
+              <a:rPr lang="hu-HU" dirty="0" err="1"/>
+              <a:t>the</a:t>
+            </a:r>
+            <a:r>
+              <a:rPr lang="hu-HU" dirty="0"/>
+              <a:t> Open/</a:t>
+            </a:r>
+            <a:r>
+              <a:rPr lang="hu-HU" dirty="0" err="1"/>
+              <a:t>Closed</a:t>
+            </a:r>
+            <a:r>
+              <a:rPr lang="hu-HU" dirty="0"/>
+              <a:t> </a:t>
+            </a:r>
+            <a:r>
+              <a:rPr lang="hu-HU" dirty="0" err="1"/>
+              <a:t>Principle</a:t>
+            </a:r>
+            <a:endParaRPr lang="hu-HU" dirty="0"/>
+          </a:p>
+        </p:txBody>
+      </p:sp>
+      <p:sp>
+        <p:nvSpPr>
+          <p:cNvPr id="3" name="Tartalom helye 2"/>
+          <p:cNvSpPr>
+            <a:spLocks noGrp="1"/>
+          </p:cNvSpPr>
+          <p:nvPr>
+            <p:ph idx="1"/>
+          </p:nvPr>
+        </p:nvSpPr>
+        <p:spPr/>
+        <p:txBody>
+          <a:bodyPr/>
+          <a:lstStyle/>
+          <a:p>
+            <a:r>
+              <a:rPr lang="hu-HU" dirty="0"/>
+              <a:t>You can change by adding new classes.</a:t>
+            </a:r>
+          </a:p>
+          <a:p>
+            <a:r>
+              <a:rPr lang="hu-HU" dirty="0" err="1"/>
+              <a:t>Smaller</a:t>
+            </a:r>
+            <a:r>
+              <a:rPr lang="hu-HU" dirty="0"/>
+              <a:t> </a:t>
+            </a:r>
+            <a:r>
+              <a:rPr lang="hu-HU" dirty="0" err="1"/>
+              <a:t>classes</a:t>
+            </a:r>
+            <a:r>
+              <a:rPr lang="hu-HU" dirty="0"/>
+              <a:t>, </a:t>
+            </a:r>
+            <a:r>
+              <a:rPr lang="hu-HU" dirty="0" err="1"/>
+              <a:t>which</a:t>
+            </a:r>
+            <a:r>
+              <a:rPr lang="hu-HU" dirty="0"/>
+              <a:t> has </a:t>
+            </a:r>
+            <a:r>
+              <a:rPr lang="hu-HU" dirty="0" err="1"/>
+              <a:t>only</a:t>
+            </a:r>
+            <a:r>
+              <a:rPr lang="hu-HU" dirty="0"/>
+              <a:t> </a:t>
+            </a:r>
+            <a:r>
+              <a:rPr lang="hu-HU" dirty="0" err="1"/>
+              <a:t>one</a:t>
+            </a:r>
+            <a:r>
+              <a:rPr lang="hu-HU" dirty="0"/>
+              <a:t> </a:t>
+            </a:r>
+            <a:r>
+              <a:rPr lang="hu-HU" dirty="0" err="1"/>
+              <a:t>job</a:t>
+            </a:r>
+            <a:r>
+              <a:rPr lang="hu-HU" dirty="0"/>
+              <a:t> (</a:t>
+            </a:r>
+            <a:r>
+              <a:rPr lang="hu-HU" dirty="0" err="1"/>
+              <a:t>following</a:t>
+            </a:r>
+            <a:r>
+              <a:rPr lang="hu-HU" dirty="0"/>
+              <a:t> </a:t>
+            </a:r>
+            <a:r>
+              <a:rPr lang="hu-HU" dirty="0" err="1"/>
+              <a:t>the</a:t>
+            </a:r>
+            <a:r>
+              <a:rPr lang="hu-HU" dirty="0"/>
+              <a:t> </a:t>
+            </a:r>
+            <a:r>
+              <a:rPr lang="hu-HU" dirty="0" err="1"/>
+              <a:t>Single</a:t>
+            </a:r>
+            <a:r>
+              <a:rPr lang="hu-HU" dirty="0"/>
+              <a:t> </a:t>
+            </a:r>
+            <a:r>
+              <a:rPr lang="hu-HU" dirty="0" err="1"/>
+              <a:t>Responsibility</a:t>
+            </a:r>
+            <a:r>
+              <a:rPr lang="hu-HU" dirty="0"/>
+              <a:t> </a:t>
+            </a:r>
+            <a:r>
+              <a:rPr lang="hu-HU" dirty="0" err="1"/>
+              <a:t>principle</a:t>
+            </a:r>
+            <a:r>
+              <a:rPr lang="hu-HU" dirty="0"/>
+              <a:t>)</a:t>
+            </a:r>
+          </a:p>
+          <a:p>
+            <a:r>
+              <a:rPr lang="hu-HU" dirty="0" err="1"/>
+              <a:t>Easy</a:t>
             </a:r>
             <a:r>
               <a:rPr lang="hu-HU" dirty="0"/>
@@ -8200,113 +8079,153 @@
             </a:r>
             <a:r>
               <a:rPr lang="hu-HU" dirty="0"/>
-              <a:t> </a:t>
-            </a:r>
-            <a:r>
-              <a:rPr lang="hu-HU" dirty="0" err="1"/>
-              <a:t>Achieve</a:t>
-            </a:r>
-            <a:r>
-              <a:rPr lang="hu-HU" dirty="0"/>
-              <a:t> OCP</a:t>
-            </a:r>
-          </a:p>
-        </p:txBody>
-      </p:sp>
-      <p:sp>
-        <p:nvSpPr>
-          <p:cNvPr id="3" name="Tartalom helye 2"/>
-          <p:cNvSpPr>
-            <a:spLocks noGrp="1"/>
-          </p:cNvSpPr>
-          <p:nvPr>
-            <p:ph idx="1"/>
-          </p:nvPr>
-        </p:nvSpPr>
-        <p:spPr/>
-        <p:txBody>
-          <a:bodyPr/>
-          <a:lstStyle/>
-          <a:p>
-            <a:r>
-              <a:rPr lang="hu-HU" dirty="0" err="1"/>
-              <a:t>Inheritance</a:t>
-            </a:r>
-            <a:r>
-              <a:rPr lang="hu-HU" dirty="0"/>
-              <a:t> / </a:t>
-            </a:r>
-            <a:r>
-              <a:rPr lang="hu-HU" dirty="0" err="1"/>
-              <a:t>Template</a:t>
-            </a:r>
-            <a:r>
-              <a:rPr lang="hu-HU" dirty="0"/>
-              <a:t> </a:t>
-            </a:r>
-            <a:r>
-              <a:rPr lang="hu-HU" dirty="0" err="1"/>
-              <a:t>Method</a:t>
-            </a:r>
-            <a:r>
-              <a:rPr lang="hu-HU" dirty="0"/>
-              <a:t> </a:t>
-            </a:r>
-            <a:r>
-              <a:rPr lang="hu-HU" dirty="0" err="1"/>
-              <a:t>Pattern</a:t>
-            </a:r>
-            <a:endParaRPr lang="hu-HU" dirty="0"/>
+              <a:t> test </a:t>
+            </a:r>
+            <a:r>
+              <a:rPr lang="hu-HU" dirty="0" err="1"/>
+              <a:t>new</a:t>
+            </a:r>
+            <a:r>
+              <a:rPr lang="hu-HU" dirty="0"/>
+              <a:t> </a:t>
+            </a:r>
+            <a:r>
+              <a:rPr lang="hu-HU" dirty="0" err="1"/>
+              <a:t>classes</a:t>
+            </a:r>
+            <a:r>
+              <a:rPr lang="hu-HU" dirty="0"/>
+              <a:t>, </a:t>
+            </a:r>
+            <a:r>
+              <a:rPr lang="hu-HU" dirty="0" err="1"/>
+              <a:t>since</a:t>
+            </a:r>
+            <a:r>
+              <a:rPr lang="hu-HU" dirty="0"/>
+              <a:t>:</a:t>
+            </a:r>
           </a:p>
           <a:p>
             <a:pPr lvl="1"/>
             <a:r>
               <a:rPr lang="hu-HU" dirty="0" err="1"/>
-              <a:t>Child</a:t>
-            </a:r>
-            <a:r>
-              <a:rPr lang="hu-HU" dirty="0"/>
-              <a:t> </a:t>
-            </a:r>
-            <a:r>
-              <a:rPr lang="hu-HU" dirty="0" err="1"/>
-              <a:t>types</a:t>
-            </a:r>
-            <a:r>
-              <a:rPr lang="hu-HU" dirty="0"/>
-              <a:t> </a:t>
-            </a:r>
-            <a:r>
-              <a:rPr lang="hu-HU" dirty="0" err="1"/>
-              <a:t>override</a:t>
-            </a:r>
-            <a:r>
-              <a:rPr lang="hu-HU" dirty="0"/>
-              <a:t> </a:t>
-            </a:r>
-            <a:r>
-              <a:rPr lang="hu-HU" dirty="0" err="1"/>
-              <a:t>behavior</a:t>
-            </a:r>
-            <a:r>
-              <a:rPr lang="hu-HU" dirty="0"/>
-              <a:t> of a </a:t>
-            </a:r>
-            <a:r>
-              <a:rPr lang="hu-HU" dirty="0" err="1"/>
-              <a:t>base</a:t>
-            </a:r>
-            <a:r>
-              <a:rPr lang="hu-HU" dirty="0"/>
-              <a:t> </a:t>
-            </a:r>
-            <a:r>
-              <a:rPr lang="hu-HU" dirty="0" err="1"/>
-              <a:t>class</a:t>
-            </a:r>
-            <a:r>
-              <a:rPr lang="hu-HU" dirty="0"/>
-              <a:t>(</a:t>
+              <a:t>Nothing</a:t>
+            </a:r>
+            <a:r>
+              <a:rPr lang="hu-HU" dirty="0"/>
+              <a:t> </a:t>
+            </a:r>
+            <a:r>
+              <a:rPr lang="hu-HU" dirty="0" err="1"/>
+              <a:t>depends</a:t>
+            </a:r>
+            <a:r>
+              <a:rPr lang="hu-HU" dirty="0"/>
+              <a:t> </a:t>
+            </a:r>
+            <a:r>
+              <a:rPr lang="hu-HU" dirty="0" err="1"/>
+              <a:t>on</a:t>
+            </a:r>
+            <a:r>
+              <a:rPr lang="hu-HU" dirty="0"/>
+              <a:t> </a:t>
+            </a:r>
+            <a:r>
+              <a:rPr lang="hu-HU" dirty="0" err="1"/>
+              <a:t>new</a:t>
+            </a:r>
+            <a:r>
+              <a:rPr lang="hu-HU" dirty="0"/>
+              <a:t> </a:t>
+            </a:r>
+            <a:r>
+              <a:rPr lang="hu-HU" dirty="0" err="1"/>
+              <a:t>classes</a:t>
+            </a:r>
+            <a:r>
+              <a:rPr lang="hu-HU" dirty="0"/>
+              <a:t>.</a:t>
+            </a:r>
+          </a:p>
+          <a:p>
+            <a:pPr lvl="1"/>
+            <a:r>
+              <a:rPr lang="hu-HU" dirty="0"/>
+              <a:t>New </a:t>
+            </a:r>
+            <a:r>
+              <a:rPr lang="hu-HU" dirty="0" err="1"/>
+              <a:t>classes</a:t>
+            </a:r>
+            <a:r>
+              <a:rPr lang="hu-HU" dirty="0"/>
+              <a:t> </a:t>
+            </a:r>
+            <a:r>
+              <a:rPr lang="hu-HU" dirty="0" err="1"/>
+              <a:t>have</a:t>
+            </a:r>
+            <a:r>
+              <a:rPr lang="hu-HU" dirty="0"/>
+              <a:t> no </a:t>
+            </a:r>
+            <a:r>
+              <a:rPr lang="hu-HU" dirty="0" err="1"/>
+              <a:t>legacy</a:t>
+            </a:r>
+            <a:r>
+              <a:rPr lang="hu-HU" dirty="0"/>
+              <a:t> </a:t>
+            </a:r>
+            <a:r>
+              <a:rPr lang="hu-HU" dirty="0" err="1"/>
+              <a:t>coupling</a:t>
+            </a:r>
+            <a:r>
+              <a:rPr lang="hu-HU" dirty="0"/>
+              <a:t> </a:t>
+            </a:r>
+            <a:r>
+              <a:rPr lang="hu-HU" dirty="0" err="1"/>
+              <a:t>to</a:t>
+            </a:r>
+            <a:r>
+              <a:rPr lang="hu-HU" dirty="0"/>
+              <a:t> </a:t>
+            </a:r>
+            <a:r>
+              <a:rPr lang="hu-HU" dirty="0" err="1"/>
+              <a:t>make</a:t>
+            </a:r>
+            <a:r>
+              <a:rPr lang="hu-HU" dirty="0"/>
+              <a:t> </a:t>
+            </a:r>
+            <a:r>
+              <a:rPr lang="hu-HU" dirty="0" err="1"/>
+              <a:t>them</a:t>
+            </a:r>
+            <a:r>
+              <a:rPr lang="hu-HU" dirty="0"/>
+              <a:t> </a:t>
+            </a:r>
+            <a:r>
+              <a:rPr lang="hu-HU" dirty="0" err="1"/>
+              <a:t>hard</a:t>
+            </a:r>
+            <a:r>
+              <a:rPr lang="hu-HU" dirty="0"/>
+              <a:t> </a:t>
+            </a:r>
+            <a:r>
+              <a:rPr lang="hu-HU" dirty="0" err="1"/>
+              <a:t>to</a:t>
+            </a:r>
+            <a:r>
+              <a:rPr lang="hu-HU" dirty="0"/>
+              <a:t> design </a:t>
             </a:r>
             <a:r>
               <a:rPr lang="hu-HU" dirty="0" err="1"/>
@@ -8314,210 +8233,8 @@
             </a:r>
             <a:r>
               <a:rPr lang="hu-HU" dirty="0"/>
-              <a:t> </a:t>
-            </a:r>
-            <a:r>
-              <a:rPr lang="hu-HU" dirty="0" err="1"/>
-              <a:t>interface</a:t>
-            </a:r>
-            <a:r>
-              <a:rPr lang="hu-HU" dirty="0"/>
-              <a:t>)</a:t>
-            </a:r>
-          </a:p>
-          <a:p>
-            <a:r>
-              <a:rPr lang="hu-HU" dirty="0" err="1"/>
-              <a:t>Composition</a:t>
-            </a:r>
-            <a:r>
-              <a:rPr lang="hu-HU" dirty="0"/>
-              <a:t> / </a:t>
-            </a:r>
-            <a:r>
-              <a:rPr lang="hu-HU" dirty="0" err="1"/>
-              <a:t>Strategy</a:t>
-            </a:r>
-            <a:r>
-              <a:rPr lang="hu-HU" dirty="0"/>
-              <a:t> </a:t>
-            </a:r>
-            <a:r>
-              <a:rPr lang="hu-HU" dirty="0" err="1"/>
-              <a:t>Pattern</a:t>
-            </a:r>
-            <a:endParaRPr lang="hu-HU" dirty="0"/>
-          </a:p>
-          <a:p>
-            <a:pPr lvl="1"/>
-            <a:r>
-              <a:rPr lang="hu-HU" dirty="0" err="1"/>
-              <a:t>Client</a:t>
-            </a:r>
-            <a:r>
-              <a:rPr lang="hu-HU" dirty="0"/>
-              <a:t> </a:t>
-            </a:r>
-            <a:r>
-              <a:rPr lang="hu-HU" dirty="0" err="1"/>
-              <a:t>code</a:t>
-            </a:r>
-            <a:r>
-              <a:rPr lang="hu-HU" dirty="0"/>
-              <a:t> </a:t>
-            </a:r>
-            <a:r>
-              <a:rPr lang="hu-HU" dirty="0" err="1"/>
-              <a:t>depeds</a:t>
-            </a:r>
-            <a:r>
-              <a:rPr lang="hu-HU" dirty="0"/>
-              <a:t> </a:t>
-            </a:r>
-            <a:r>
-              <a:rPr lang="hu-HU" dirty="0" err="1"/>
-              <a:t>on</a:t>
-            </a:r>
-            <a:r>
-              <a:rPr lang="hu-HU" dirty="0"/>
-              <a:t> </a:t>
-            </a:r>
-            <a:r>
-              <a:rPr lang="hu-HU" dirty="0" err="1"/>
-              <a:t>abstraction</a:t>
-            </a:r>
-            <a:r>
-              <a:rPr lang="hu-HU" dirty="0"/>
-              <a:t>(</a:t>
-            </a:r>
-            <a:r>
-              <a:rPr lang="hu-HU" dirty="0" err="1"/>
-              <a:t>Pass</a:t>
-            </a:r>
-            <a:r>
-              <a:rPr lang="hu-HU" dirty="0"/>
-              <a:t> </a:t>
-            </a:r>
-            <a:r>
-              <a:rPr lang="hu-HU" dirty="0" err="1"/>
-              <a:t>in</a:t>
-            </a:r>
-            <a:r>
-              <a:rPr lang="hu-HU" dirty="0"/>
-              <a:t> </a:t>
-            </a:r>
-            <a:r>
-              <a:rPr lang="hu-HU" dirty="0" err="1"/>
-              <a:t>Implementation</a:t>
-            </a:r>
-            <a:r>
-              <a:rPr lang="hu-HU" dirty="0"/>
-              <a:t> </a:t>
-            </a:r>
-            <a:r>
-              <a:rPr lang="hu-HU" dirty="0" err="1"/>
-              <a:t>in</a:t>
-            </a:r>
-            <a:r>
-              <a:rPr lang="hu-HU" dirty="0"/>
-              <a:t> </a:t>
-            </a:r>
-            <a:r>
-              <a:rPr lang="hu-HU" dirty="0" err="1"/>
-              <a:t>the</a:t>
-            </a:r>
-            <a:r>
-              <a:rPr lang="hu-HU" dirty="0"/>
-              <a:t> </a:t>
-            </a:r>
-            <a:r>
-              <a:rPr lang="hu-HU" dirty="0" err="1"/>
-              <a:t>costructor</a:t>
-            </a:r>
-            <a:r>
-              <a:rPr lang="hu-HU" dirty="0"/>
-              <a:t>)</a:t>
-            </a:r>
-          </a:p>
-          <a:p>
-            <a:pPr lvl="1"/>
-            <a:r>
-              <a:rPr lang="hu-HU" dirty="0" err="1"/>
-              <a:t>Provides</a:t>
-            </a:r>
-            <a:r>
-              <a:rPr lang="hu-HU" dirty="0"/>
-              <a:t> a „</a:t>
-            </a:r>
-            <a:r>
-              <a:rPr lang="hu-HU" dirty="0" err="1"/>
-              <a:t>plug</a:t>
-            </a:r>
-            <a:r>
-              <a:rPr lang="hu-HU" dirty="0"/>
-              <a:t> </a:t>
-            </a:r>
-            <a:r>
-              <a:rPr lang="hu-HU" dirty="0" err="1"/>
-              <a:t>in</a:t>
-            </a:r>
-            <a:r>
-              <a:rPr lang="hu-HU" dirty="0"/>
-              <a:t>” </a:t>
-            </a:r>
-            <a:r>
-              <a:rPr lang="hu-HU" dirty="0" err="1"/>
-              <a:t>model</a:t>
-            </a:r>
-            <a:endParaRPr lang="hu-HU" dirty="0"/>
-          </a:p>
-          <a:p>
-            <a:pPr lvl="1"/>
-            <a:r>
-              <a:rPr lang="hu-HU" dirty="0" err="1"/>
-              <a:t>Implementations</a:t>
-            </a:r>
-            <a:r>
-              <a:rPr lang="hu-HU" dirty="0"/>
-              <a:t> </a:t>
-            </a:r>
-            <a:r>
-              <a:rPr lang="hu-HU" dirty="0" err="1"/>
-              <a:t>utilize</a:t>
-            </a:r>
-            <a:r>
-              <a:rPr lang="hu-HU" dirty="0"/>
-              <a:t> </a:t>
-            </a:r>
-            <a:r>
-              <a:rPr lang="hu-HU" dirty="0" err="1"/>
-              <a:t>Inheritance</a:t>
-            </a:r>
-            <a:r>
-              <a:rPr lang="hu-HU" dirty="0"/>
-              <a:t>, </a:t>
-            </a:r>
-            <a:r>
-              <a:rPr lang="hu-HU" dirty="0" err="1"/>
-              <a:t>Client</a:t>
-            </a:r>
-            <a:r>
-              <a:rPr lang="hu-HU" dirty="0"/>
-              <a:t> </a:t>
-            </a:r>
-            <a:r>
-              <a:rPr lang="hu-HU" dirty="0" err="1"/>
-              <a:t>utilizes</a:t>
-            </a:r>
-            <a:r>
-              <a:rPr lang="hu-HU" dirty="0"/>
-              <a:t> </a:t>
-            </a:r>
-            <a:r>
-              <a:rPr lang="hu-HU" dirty="0" err="1"/>
-              <a:t>composition</a:t>
-            </a:r>
-            <a:endParaRPr lang="hu-HU" dirty="0"/>
+              <a:t> test. </a:t>
+            </a:r>
           </a:p>
         </p:txBody>
       </p:sp>
@@ -8547,7 +8264,7 @@
     </p:spTree>
     <p:extLst>
       <p:ext uri="{BB962C8B-B14F-4D97-AF65-F5344CB8AC3E}">
-        <p14:creationId xmlns:p14="http://schemas.microsoft.com/office/powerpoint/2010/main" val="2495193176"/>
+        <p14:creationId xmlns:p14="http://schemas.microsoft.com/office/powerpoint/2010/main" val="1216626679"/>
       </p:ext>
     </p:extLst>
   </p:cSld>
@@ -8590,8 +8307,16 @@
           <a:lstStyle/>
           <a:p>
             <a:r>
-              <a:rPr lang="hu-HU" dirty="0" err="1"/>
-              <a:t>References</a:t>
+              <a:rPr lang="hu-HU" dirty="0" err="1" smtClean="0"/>
+              <a:t>Code</a:t>
+            </a:r>
+            <a:r>
+              <a:rPr lang="hu-HU" dirty="0" smtClean="0"/>
+              <a:t> </a:t>
+            </a:r>
+            <a:r>
+              <a:rPr lang="hu-HU" dirty="0" err="1" smtClean="0"/>
+              <a:t>Example</a:t>
             </a:r>
             <a:endParaRPr lang="hu-HU" dirty="0"/>
           </a:p>
@@ -8612,36 +8337,13 @@
           <a:bodyPr/>
           <a:lstStyle/>
           <a:p>
-            <a:r>
-              <a:rPr lang="en-US" dirty="0"/>
-              <a:t>Design Patterns: Elements of Reusable Object-Oriented Software</a:t>
-            </a:r>
-            <a:r>
-              <a:rPr lang="hu-HU" dirty="0"/>
-              <a:t> (1994)</a:t>
-            </a:r>
-            <a:endParaRPr lang="sv-SE" dirty="0"/>
-          </a:p>
-          <a:p>
-            <a:r>
-              <a:rPr lang="hu-HU" dirty="0"/>
-              <a:t>Head First Design Patterns</a:t>
-            </a:r>
-          </a:p>
-          <a:p>
-            <a:r>
-              <a:rPr lang="hu-HU" dirty="0"/>
-              <a:t>https://dzone.com/articles/design-patterns-uncovered-0</a:t>
-            </a:r>
-          </a:p>
-          <a:p>
-            <a:endParaRPr lang="hu-HU" dirty="0"/>
-          </a:p>
-        </p:txBody>
-      </p:sp>
-      <p:sp>
-        <p:nvSpPr>
-          <p:cNvPr id="4" name="Slide Number Placeholder 3"/>
+            <a:endParaRPr lang="hu-HU"/>
+          </a:p>
+        </p:txBody>
+      </p:sp>
+      <p:sp>
+        <p:nvSpPr>
+          <p:cNvPr id="4" name="Dia számának helye 3"/>
           <p:cNvSpPr>
             <a:spLocks noGrp="1"/>
           </p:cNvSpPr>
@@ -8665,7 +8367,906 @@
     </p:spTree>
     <p:extLst>
       <p:ext uri="{BB962C8B-B14F-4D97-AF65-F5344CB8AC3E}">
-        <p14:creationId xmlns:p14="http://schemas.microsoft.com/office/powerpoint/2010/main" val="2474760466"/>
+        <p14:creationId xmlns:p14="http://schemas.microsoft.com/office/powerpoint/2010/main" val="4936233"/>
+      </p:ext>
+    </p:extLst>
+  </p:cSld>
+  <p:clrMapOvr>
+    <a:masterClrMapping/>
+  </p:clrMapOvr>
+</p:sld>
+</file>
+
+<file path=ppt/slides/slide27.xml><?xml version="1.0" encoding="utf-8"?>
+<p:sld xmlns:a="http://schemas.openxmlformats.org/drawingml/2006/main" xmlns:r="http://schemas.openxmlformats.org/officeDocument/2006/relationships" xmlns:p="http://schemas.openxmlformats.org/presentationml/2006/main">
+  <p:cSld>
+    <p:spTree>
+      <p:nvGrpSpPr>
+        <p:cNvPr id="1" name=""/>
+        <p:cNvGrpSpPr/>
+        <p:nvPr/>
+      </p:nvGrpSpPr>
+      <p:grpSpPr>
+        <a:xfrm>
+          <a:off x="0" y="0"/>
+          <a:ext cx="0" cy="0"/>
+          <a:chOff x="0" y="0"/>
+          <a:chExt cx="0" cy="0"/>
+        </a:xfrm>
+      </p:grpSpPr>
+      <p:sp>
+        <p:nvSpPr>
+          <p:cNvPr id="2" name="Cím 1"/>
+          <p:cNvSpPr>
+            <a:spLocks noGrp="1"/>
+          </p:cNvSpPr>
+          <p:nvPr>
+            <p:ph type="title"/>
+          </p:nvPr>
+        </p:nvSpPr>
+        <p:spPr/>
+        <p:txBody>
+          <a:bodyPr/>
+          <a:lstStyle/>
+          <a:p>
+            <a:r>
+              <a:rPr lang="hu-HU" dirty="0" err="1"/>
+              <a:t>Approaches</a:t>
+            </a:r>
+            <a:r>
+              <a:rPr lang="hu-HU" dirty="0"/>
+              <a:t> </a:t>
+            </a:r>
+            <a:r>
+              <a:rPr lang="hu-HU" dirty="0" err="1"/>
+              <a:t>to</a:t>
+            </a:r>
+            <a:r>
+              <a:rPr lang="hu-HU" dirty="0"/>
+              <a:t> </a:t>
+            </a:r>
+            <a:r>
+              <a:rPr lang="hu-HU" dirty="0" err="1"/>
+              <a:t>Achieve</a:t>
+            </a:r>
+            <a:r>
+              <a:rPr lang="hu-HU" dirty="0"/>
+              <a:t> OCP</a:t>
+            </a:r>
+          </a:p>
+        </p:txBody>
+      </p:sp>
+      <p:sp>
+        <p:nvSpPr>
+          <p:cNvPr id="3" name="Tartalom helye 2"/>
+          <p:cNvSpPr>
+            <a:spLocks noGrp="1"/>
+          </p:cNvSpPr>
+          <p:nvPr>
+            <p:ph idx="1"/>
+          </p:nvPr>
+        </p:nvSpPr>
+        <p:spPr/>
+        <p:txBody>
+          <a:bodyPr/>
+          <a:lstStyle/>
+          <a:p>
+            <a:r>
+              <a:rPr lang="hu-HU" dirty="0" err="1"/>
+              <a:t>Inheritance</a:t>
+            </a:r>
+            <a:r>
+              <a:rPr lang="hu-HU" dirty="0"/>
+              <a:t> / </a:t>
+            </a:r>
+            <a:r>
+              <a:rPr lang="hu-HU" dirty="0" err="1"/>
+              <a:t>Template</a:t>
+            </a:r>
+            <a:r>
+              <a:rPr lang="hu-HU" dirty="0"/>
+              <a:t> </a:t>
+            </a:r>
+            <a:r>
+              <a:rPr lang="hu-HU" dirty="0" err="1"/>
+              <a:t>Method</a:t>
+            </a:r>
+            <a:r>
+              <a:rPr lang="hu-HU" dirty="0"/>
+              <a:t> </a:t>
+            </a:r>
+            <a:r>
+              <a:rPr lang="hu-HU" dirty="0" err="1"/>
+              <a:t>Pattern</a:t>
+            </a:r>
+            <a:endParaRPr lang="hu-HU" dirty="0"/>
+          </a:p>
+          <a:p>
+            <a:pPr lvl="1"/>
+            <a:r>
+              <a:rPr lang="hu-HU" dirty="0" err="1"/>
+              <a:t>Child</a:t>
+            </a:r>
+            <a:r>
+              <a:rPr lang="hu-HU" dirty="0"/>
+              <a:t> </a:t>
+            </a:r>
+            <a:r>
+              <a:rPr lang="hu-HU" dirty="0" err="1"/>
+              <a:t>types</a:t>
+            </a:r>
+            <a:r>
+              <a:rPr lang="hu-HU" dirty="0"/>
+              <a:t> </a:t>
+            </a:r>
+            <a:r>
+              <a:rPr lang="hu-HU" dirty="0" err="1"/>
+              <a:t>override</a:t>
+            </a:r>
+            <a:r>
+              <a:rPr lang="hu-HU" dirty="0"/>
+              <a:t> </a:t>
+            </a:r>
+            <a:r>
+              <a:rPr lang="hu-HU" dirty="0" err="1"/>
+              <a:t>behavior</a:t>
+            </a:r>
+            <a:r>
+              <a:rPr lang="hu-HU" dirty="0"/>
+              <a:t> of a </a:t>
+            </a:r>
+            <a:r>
+              <a:rPr lang="hu-HU" dirty="0" err="1"/>
+              <a:t>base</a:t>
+            </a:r>
+            <a:r>
+              <a:rPr lang="hu-HU" dirty="0"/>
+              <a:t> </a:t>
+            </a:r>
+            <a:r>
+              <a:rPr lang="hu-HU" dirty="0" err="1"/>
+              <a:t>class</a:t>
+            </a:r>
+            <a:r>
+              <a:rPr lang="hu-HU" dirty="0"/>
+              <a:t>(</a:t>
+            </a:r>
+            <a:r>
+              <a:rPr lang="hu-HU" dirty="0" err="1"/>
+              <a:t>or</a:t>
+            </a:r>
+            <a:r>
+              <a:rPr lang="hu-HU" dirty="0"/>
+              <a:t> </a:t>
+            </a:r>
+            <a:r>
+              <a:rPr lang="hu-HU" dirty="0" err="1"/>
+              <a:t>interface</a:t>
+            </a:r>
+            <a:r>
+              <a:rPr lang="hu-HU" dirty="0"/>
+              <a:t>)</a:t>
+            </a:r>
+          </a:p>
+          <a:p>
+            <a:r>
+              <a:rPr lang="hu-HU" dirty="0" err="1"/>
+              <a:t>Composition</a:t>
+            </a:r>
+            <a:r>
+              <a:rPr lang="hu-HU" dirty="0"/>
+              <a:t> / </a:t>
+            </a:r>
+            <a:r>
+              <a:rPr lang="hu-HU" dirty="0" err="1"/>
+              <a:t>Strategy</a:t>
+            </a:r>
+            <a:r>
+              <a:rPr lang="hu-HU" dirty="0"/>
+              <a:t> </a:t>
+            </a:r>
+            <a:r>
+              <a:rPr lang="hu-HU" dirty="0" err="1"/>
+              <a:t>Pattern</a:t>
+            </a:r>
+            <a:endParaRPr lang="hu-HU" dirty="0"/>
+          </a:p>
+          <a:p>
+            <a:pPr lvl="1"/>
+            <a:r>
+              <a:rPr lang="hu-HU" dirty="0" err="1"/>
+              <a:t>Client</a:t>
+            </a:r>
+            <a:r>
+              <a:rPr lang="hu-HU" dirty="0"/>
+              <a:t> </a:t>
+            </a:r>
+            <a:r>
+              <a:rPr lang="hu-HU" dirty="0" err="1"/>
+              <a:t>code</a:t>
+            </a:r>
+            <a:r>
+              <a:rPr lang="hu-HU" dirty="0"/>
+              <a:t> </a:t>
+            </a:r>
+            <a:r>
+              <a:rPr lang="hu-HU" dirty="0" err="1"/>
+              <a:t>depeds</a:t>
+            </a:r>
+            <a:r>
+              <a:rPr lang="hu-HU" dirty="0"/>
+              <a:t> </a:t>
+            </a:r>
+            <a:r>
+              <a:rPr lang="hu-HU" dirty="0" err="1"/>
+              <a:t>on</a:t>
+            </a:r>
+            <a:r>
+              <a:rPr lang="hu-HU" dirty="0"/>
+              <a:t> </a:t>
+            </a:r>
+            <a:r>
+              <a:rPr lang="hu-HU" dirty="0" err="1"/>
+              <a:t>abstraction</a:t>
+            </a:r>
+            <a:r>
+              <a:rPr lang="hu-HU" dirty="0"/>
+              <a:t>(</a:t>
+            </a:r>
+            <a:r>
+              <a:rPr lang="hu-HU" dirty="0" err="1"/>
+              <a:t>Pass</a:t>
+            </a:r>
+            <a:r>
+              <a:rPr lang="hu-HU" dirty="0"/>
+              <a:t> </a:t>
+            </a:r>
+            <a:r>
+              <a:rPr lang="hu-HU" dirty="0" err="1"/>
+              <a:t>in</a:t>
+            </a:r>
+            <a:r>
+              <a:rPr lang="hu-HU" dirty="0"/>
+              <a:t> </a:t>
+            </a:r>
+            <a:r>
+              <a:rPr lang="hu-HU" dirty="0" err="1"/>
+              <a:t>Implementation</a:t>
+            </a:r>
+            <a:r>
+              <a:rPr lang="hu-HU" dirty="0"/>
+              <a:t> </a:t>
+            </a:r>
+            <a:r>
+              <a:rPr lang="hu-HU" dirty="0" err="1"/>
+              <a:t>in</a:t>
+            </a:r>
+            <a:r>
+              <a:rPr lang="hu-HU" dirty="0"/>
+              <a:t> </a:t>
+            </a:r>
+            <a:r>
+              <a:rPr lang="hu-HU" dirty="0" err="1"/>
+              <a:t>the</a:t>
+            </a:r>
+            <a:r>
+              <a:rPr lang="hu-HU" dirty="0"/>
+              <a:t> </a:t>
+            </a:r>
+            <a:r>
+              <a:rPr lang="hu-HU" dirty="0" err="1"/>
+              <a:t>costructor</a:t>
+            </a:r>
+            <a:r>
+              <a:rPr lang="hu-HU" dirty="0"/>
+              <a:t>)</a:t>
+            </a:r>
+          </a:p>
+          <a:p>
+            <a:pPr lvl="1"/>
+            <a:r>
+              <a:rPr lang="hu-HU" dirty="0" err="1"/>
+              <a:t>Provides</a:t>
+            </a:r>
+            <a:r>
+              <a:rPr lang="hu-HU" dirty="0"/>
+              <a:t> a „</a:t>
+            </a:r>
+            <a:r>
+              <a:rPr lang="hu-HU" dirty="0" err="1"/>
+              <a:t>plug</a:t>
+            </a:r>
+            <a:r>
+              <a:rPr lang="hu-HU" dirty="0"/>
+              <a:t> </a:t>
+            </a:r>
+            <a:r>
+              <a:rPr lang="hu-HU" dirty="0" err="1"/>
+              <a:t>in</a:t>
+            </a:r>
+            <a:r>
+              <a:rPr lang="hu-HU" dirty="0"/>
+              <a:t>” </a:t>
+            </a:r>
+            <a:r>
+              <a:rPr lang="hu-HU" dirty="0" err="1"/>
+              <a:t>model</a:t>
+            </a:r>
+            <a:endParaRPr lang="hu-HU" dirty="0"/>
+          </a:p>
+          <a:p>
+            <a:pPr lvl="1"/>
+            <a:r>
+              <a:rPr lang="hu-HU" dirty="0" err="1"/>
+              <a:t>Implementations</a:t>
+            </a:r>
+            <a:r>
+              <a:rPr lang="hu-HU" dirty="0"/>
+              <a:t> </a:t>
+            </a:r>
+            <a:r>
+              <a:rPr lang="hu-HU" dirty="0" err="1"/>
+              <a:t>utilize</a:t>
+            </a:r>
+            <a:r>
+              <a:rPr lang="hu-HU" dirty="0"/>
+              <a:t> </a:t>
+            </a:r>
+            <a:r>
+              <a:rPr lang="hu-HU" dirty="0" err="1"/>
+              <a:t>Inheritance</a:t>
+            </a:r>
+            <a:r>
+              <a:rPr lang="hu-HU" dirty="0"/>
+              <a:t>, </a:t>
+            </a:r>
+            <a:r>
+              <a:rPr lang="hu-HU" dirty="0" err="1"/>
+              <a:t>Client</a:t>
+            </a:r>
+            <a:r>
+              <a:rPr lang="hu-HU" dirty="0"/>
+              <a:t> </a:t>
+            </a:r>
+            <a:r>
+              <a:rPr lang="hu-HU" dirty="0" err="1"/>
+              <a:t>utilizes</a:t>
+            </a:r>
+            <a:r>
+              <a:rPr lang="hu-HU" dirty="0"/>
+              <a:t> </a:t>
+            </a:r>
+            <a:r>
+              <a:rPr lang="hu-HU" dirty="0" err="1"/>
+              <a:t>composition</a:t>
+            </a:r>
+            <a:endParaRPr lang="hu-HU" dirty="0"/>
+          </a:p>
+        </p:txBody>
+      </p:sp>
+      <p:sp>
+        <p:nvSpPr>
+          <p:cNvPr id="4" name="Slide Number Placeholder 3"/>
+          <p:cNvSpPr>
+            <a:spLocks noGrp="1"/>
+          </p:cNvSpPr>
+          <p:nvPr>
+            <p:ph type="sldNum" sz="quarter" idx="12"/>
+          </p:nvPr>
+        </p:nvSpPr>
+        <p:spPr/>
+        <p:txBody>
+          <a:bodyPr/>
+          <a:lstStyle/>
+          <a:p>
+            <a:fld id="{F28C9355-BD38-4B88-A605-51440FB067EA}" type="slidenum">
+              <a:rPr lang="hu-HU" smtClean="0"/>
+              <a:t>27</a:t>
+            </a:fld>
+            <a:endParaRPr lang="hu-HU"/>
+          </a:p>
+        </p:txBody>
+      </p:sp>
+    </p:spTree>
+    <p:extLst>
+      <p:ext uri="{BB962C8B-B14F-4D97-AF65-F5344CB8AC3E}">
+        <p14:creationId xmlns:p14="http://schemas.microsoft.com/office/powerpoint/2010/main" val="2495193176"/>
+      </p:ext>
+    </p:extLst>
+  </p:cSld>
+  <p:clrMapOvr>
+    <a:masterClrMapping/>
+  </p:clrMapOvr>
+</p:sld>
+</file>
+
+<file path=ppt/slides/slide28.xml><?xml version="1.0" encoding="utf-8"?>
+<p:sld xmlns:a="http://schemas.openxmlformats.org/drawingml/2006/main" xmlns:r="http://schemas.openxmlformats.org/officeDocument/2006/relationships" xmlns:p="http://schemas.openxmlformats.org/presentationml/2006/main">
+  <p:cSld>
+    <p:spTree>
+      <p:nvGrpSpPr>
+        <p:cNvPr id="1" name=""/>
+        <p:cNvGrpSpPr/>
+        <p:nvPr/>
+      </p:nvGrpSpPr>
+      <p:grpSpPr>
+        <a:xfrm>
+          <a:off x="0" y="0"/>
+          <a:ext cx="0" cy="0"/>
+          <a:chOff x="0" y="0"/>
+          <a:chExt cx="0" cy="0"/>
+        </a:xfrm>
+      </p:grpSpPr>
+      <p:sp>
+        <p:nvSpPr>
+          <p:cNvPr id="2" name="Cím 1"/>
+          <p:cNvSpPr>
+            <a:spLocks noGrp="1"/>
+          </p:cNvSpPr>
+          <p:nvPr>
+            <p:ph type="title"/>
+          </p:nvPr>
+        </p:nvSpPr>
+        <p:spPr/>
+        <p:txBody>
+          <a:bodyPr/>
+          <a:lstStyle/>
+          <a:p>
+            <a:r>
+              <a:rPr lang="hu-HU" dirty="0" err="1" smtClean="0"/>
+              <a:t>When</a:t>
+            </a:r>
+            <a:r>
+              <a:rPr lang="hu-HU" dirty="0" smtClean="0"/>
+              <a:t> </a:t>
+            </a:r>
+            <a:r>
+              <a:rPr lang="hu-HU" dirty="0" err="1" smtClean="0"/>
+              <a:t>do</a:t>
+            </a:r>
+            <a:r>
+              <a:rPr lang="hu-HU" dirty="0" smtClean="0"/>
+              <a:t> </a:t>
+            </a:r>
+            <a:r>
+              <a:rPr lang="hu-HU" dirty="0" err="1" smtClean="0"/>
+              <a:t>we</a:t>
+            </a:r>
+            <a:r>
+              <a:rPr lang="hu-HU" dirty="0" smtClean="0"/>
+              <a:t> </a:t>
+            </a:r>
+            <a:r>
+              <a:rPr lang="hu-HU" dirty="0" err="1" smtClean="0"/>
+              <a:t>apply</a:t>
+            </a:r>
+            <a:r>
+              <a:rPr lang="hu-HU" dirty="0" smtClean="0"/>
+              <a:t> OCP?</a:t>
+            </a:r>
+            <a:endParaRPr lang="hu-HU" dirty="0"/>
+          </a:p>
+        </p:txBody>
+      </p:sp>
+      <p:sp>
+        <p:nvSpPr>
+          <p:cNvPr id="3" name="Tartalom helye 2"/>
+          <p:cNvSpPr>
+            <a:spLocks noGrp="1"/>
+          </p:cNvSpPr>
+          <p:nvPr>
+            <p:ph idx="1"/>
+          </p:nvPr>
+        </p:nvSpPr>
+        <p:spPr/>
+        <p:txBody>
+          <a:bodyPr>
+            <a:normAutofit lnSpcReduction="10000"/>
+          </a:bodyPr>
+          <a:lstStyle/>
+          <a:p>
+            <a:r>
+              <a:rPr lang="hu-HU" dirty="0" err="1" smtClean="0"/>
+              <a:t>Experience</a:t>
+            </a:r>
+            <a:r>
+              <a:rPr lang="hu-HU" dirty="0" smtClean="0"/>
+              <a:t> </a:t>
+            </a:r>
+            <a:r>
+              <a:rPr lang="hu-HU" dirty="0" err="1" smtClean="0"/>
+              <a:t>tells</a:t>
+            </a:r>
+            <a:r>
+              <a:rPr lang="hu-HU" dirty="0" smtClean="0"/>
+              <a:t> </a:t>
+            </a:r>
+            <a:r>
+              <a:rPr lang="hu-HU" dirty="0" err="1" smtClean="0"/>
+              <a:t>you</a:t>
+            </a:r>
+            <a:endParaRPr lang="hu-HU" dirty="0"/>
+          </a:p>
+          <a:p>
+            <a:r>
+              <a:rPr lang="hu-HU" dirty="0" smtClean="0"/>
+              <a:t>„</a:t>
+            </a:r>
+            <a:r>
+              <a:rPr lang="hu-HU" dirty="0" err="1" smtClean="0"/>
+              <a:t>Fool</a:t>
+            </a:r>
+            <a:r>
+              <a:rPr lang="hu-HU" dirty="0" smtClean="0"/>
+              <a:t> </a:t>
+            </a:r>
+            <a:r>
+              <a:rPr lang="hu-HU" dirty="0" err="1" smtClean="0"/>
+              <a:t>me</a:t>
+            </a:r>
+            <a:r>
+              <a:rPr lang="hu-HU" dirty="0" smtClean="0"/>
+              <a:t> </a:t>
+            </a:r>
+            <a:r>
+              <a:rPr lang="hu-HU" dirty="0" err="1" smtClean="0"/>
+              <a:t>once</a:t>
+            </a:r>
+            <a:r>
+              <a:rPr lang="hu-HU" dirty="0" smtClean="0"/>
+              <a:t>, </a:t>
+            </a:r>
+            <a:r>
+              <a:rPr lang="hu-HU" dirty="0" err="1" smtClean="0"/>
+              <a:t>shame</a:t>
+            </a:r>
+            <a:r>
+              <a:rPr lang="hu-HU" dirty="0" smtClean="0"/>
+              <a:t> </a:t>
+            </a:r>
+            <a:r>
+              <a:rPr lang="hu-HU" dirty="0" err="1" smtClean="0"/>
+              <a:t>on</a:t>
+            </a:r>
+            <a:r>
+              <a:rPr lang="hu-HU" dirty="0" smtClean="0"/>
+              <a:t> </a:t>
+            </a:r>
+            <a:r>
+              <a:rPr lang="hu-HU" dirty="0" err="1" smtClean="0"/>
+              <a:t>you</a:t>
+            </a:r>
+            <a:r>
+              <a:rPr lang="hu-HU" dirty="0" smtClean="0"/>
+              <a:t>,. </a:t>
+            </a:r>
+            <a:r>
+              <a:rPr lang="hu-HU" dirty="0" err="1" smtClean="0"/>
+              <a:t>Fool</a:t>
+            </a:r>
+            <a:r>
+              <a:rPr lang="hu-HU" dirty="0" smtClean="0"/>
+              <a:t> </a:t>
+            </a:r>
+            <a:r>
+              <a:rPr lang="hu-HU" dirty="0" err="1" smtClean="0"/>
+              <a:t>me</a:t>
+            </a:r>
+            <a:r>
+              <a:rPr lang="hu-HU" dirty="0" smtClean="0"/>
+              <a:t> </a:t>
+            </a:r>
+            <a:r>
+              <a:rPr lang="hu-HU" dirty="0" err="1" smtClean="0"/>
+              <a:t>twice</a:t>
+            </a:r>
+            <a:r>
+              <a:rPr lang="hu-HU" dirty="0" smtClean="0"/>
+              <a:t> </a:t>
+            </a:r>
+            <a:r>
+              <a:rPr lang="hu-HU" dirty="0" err="1" smtClean="0"/>
+              <a:t>shame</a:t>
+            </a:r>
+            <a:r>
+              <a:rPr lang="hu-HU" dirty="0" smtClean="0"/>
+              <a:t> </a:t>
+            </a:r>
+            <a:r>
+              <a:rPr lang="hu-HU" dirty="0" err="1" smtClean="0"/>
+              <a:t>on</a:t>
+            </a:r>
+            <a:r>
+              <a:rPr lang="hu-HU" dirty="0" smtClean="0"/>
+              <a:t> </a:t>
+            </a:r>
+            <a:r>
+              <a:rPr lang="hu-HU" dirty="0" err="1" smtClean="0"/>
+              <a:t>me</a:t>
+            </a:r>
+            <a:r>
+              <a:rPr lang="hu-HU" dirty="0" smtClean="0"/>
+              <a:t>”</a:t>
+            </a:r>
+          </a:p>
+          <a:p>
+            <a:r>
+              <a:rPr lang="hu-HU" dirty="0" smtClean="0"/>
+              <a:t>Dont </a:t>
+            </a:r>
+            <a:r>
+              <a:rPr lang="hu-HU" dirty="0" err="1" smtClean="0"/>
+              <a:t>apply</a:t>
+            </a:r>
+            <a:r>
+              <a:rPr lang="hu-HU" dirty="0" smtClean="0"/>
+              <a:t> OCP </a:t>
+            </a:r>
+            <a:r>
+              <a:rPr lang="hu-HU" dirty="0" err="1" smtClean="0"/>
+              <a:t>at</a:t>
+            </a:r>
+            <a:r>
+              <a:rPr lang="hu-HU" dirty="0" smtClean="0"/>
+              <a:t> </a:t>
+            </a:r>
+            <a:r>
+              <a:rPr lang="hu-HU" dirty="0" err="1" smtClean="0"/>
+              <a:t>first</a:t>
+            </a:r>
+            <a:endParaRPr lang="hu-HU" dirty="0" smtClean="0"/>
+          </a:p>
+          <a:p>
+            <a:r>
+              <a:rPr lang="hu-HU" dirty="0" err="1" smtClean="0"/>
+              <a:t>If</a:t>
+            </a:r>
+            <a:r>
+              <a:rPr lang="hu-HU" dirty="0" smtClean="0"/>
+              <a:t> </a:t>
+            </a:r>
+            <a:r>
+              <a:rPr lang="hu-HU" dirty="0" err="1" smtClean="0"/>
+              <a:t>the</a:t>
+            </a:r>
+            <a:r>
+              <a:rPr lang="hu-HU" dirty="0" smtClean="0"/>
+              <a:t> </a:t>
+            </a:r>
+            <a:r>
+              <a:rPr lang="hu-HU" dirty="0" err="1" smtClean="0"/>
+              <a:t>module</a:t>
+            </a:r>
+            <a:r>
+              <a:rPr lang="hu-HU" dirty="0" smtClean="0"/>
+              <a:t> </a:t>
+            </a:r>
+            <a:r>
+              <a:rPr lang="hu-HU" dirty="0" err="1" smtClean="0"/>
+              <a:t>changes</a:t>
+            </a:r>
+            <a:r>
+              <a:rPr lang="hu-HU" dirty="0" smtClean="0"/>
+              <a:t> </a:t>
+            </a:r>
+            <a:r>
+              <a:rPr lang="hu-HU" dirty="0" err="1" smtClean="0"/>
+              <a:t>once</a:t>
+            </a:r>
+            <a:r>
+              <a:rPr lang="hu-HU" dirty="0" smtClean="0"/>
+              <a:t>, </a:t>
+            </a:r>
+            <a:r>
+              <a:rPr lang="hu-HU" dirty="0" err="1" smtClean="0"/>
+              <a:t>accept</a:t>
+            </a:r>
+            <a:r>
+              <a:rPr lang="hu-HU" dirty="0" smtClean="0"/>
+              <a:t> </a:t>
+            </a:r>
+            <a:r>
+              <a:rPr lang="hu-HU" dirty="0" err="1" smtClean="0"/>
+              <a:t>it</a:t>
+            </a:r>
+            <a:r>
+              <a:rPr lang="hu-HU" dirty="0" smtClean="0"/>
+              <a:t>.</a:t>
+            </a:r>
+          </a:p>
+          <a:p>
+            <a:r>
+              <a:rPr lang="hu-HU" dirty="0" err="1" smtClean="0"/>
+              <a:t>If</a:t>
+            </a:r>
+            <a:r>
+              <a:rPr lang="hu-HU" dirty="0" smtClean="0"/>
+              <a:t> </a:t>
+            </a:r>
+            <a:r>
+              <a:rPr lang="hu-HU" dirty="0" err="1" smtClean="0"/>
+              <a:t>it</a:t>
+            </a:r>
+            <a:r>
+              <a:rPr lang="hu-HU" dirty="0" smtClean="0"/>
+              <a:t> </a:t>
+            </a:r>
+            <a:r>
+              <a:rPr lang="hu-HU" dirty="0" err="1" smtClean="0"/>
+              <a:t>changes</a:t>
+            </a:r>
+            <a:r>
+              <a:rPr lang="hu-HU" dirty="0"/>
+              <a:t> </a:t>
+            </a:r>
+            <a:r>
+              <a:rPr lang="hu-HU" dirty="0" err="1" smtClean="0"/>
+              <a:t>at</a:t>
+            </a:r>
+            <a:r>
+              <a:rPr lang="hu-HU" dirty="0" smtClean="0"/>
+              <a:t> </a:t>
+            </a:r>
+            <a:r>
+              <a:rPr lang="hu-HU" dirty="0" err="1" smtClean="0"/>
+              <a:t>the</a:t>
+            </a:r>
+            <a:r>
+              <a:rPr lang="hu-HU" dirty="0" smtClean="0"/>
+              <a:t> </a:t>
+            </a:r>
+            <a:r>
+              <a:rPr lang="hu-HU" dirty="0" err="1" smtClean="0"/>
+              <a:t>second</a:t>
+            </a:r>
+            <a:r>
+              <a:rPr lang="hu-HU" dirty="0" smtClean="0"/>
+              <a:t> </a:t>
+            </a:r>
+            <a:r>
+              <a:rPr lang="hu-HU" dirty="0" err="1" smtClean="0"/>
+              <a:t>time</a:t>
+            </a:r>
+            <a:r>
+              <a:rPr lang="hu-HU" dirty="0" smtClean="0"/>
+              <a:t>, </a:t>
+            </a:r>
+            <a:r>
+              <a:rPr lang="hu-HU" dirty="0" err="1" smtClean="0"/>
+              <a:t>refactor</a:t>
+            </a:r>
+            <a:r>
+              <a:rPr lang="hu-HU" dirty="0" smtClean="0"/>
+              <a:t> </a:t>
+            </a:r>
+            <a:r>
+              <a:rPr lang="hu-HU" dirty="0" err="1" smtClean="0"/>
+              <a:t>to</a:t>
+            </a:r>
+            <a:r>
+              <a:rPr lang="hu-HU" dirty="0" smtClean="0"/>
+              <a:t> </a:t>
+            </a:r>
+            <a:r>
+              <a:rPr lang="hu-HU" dirty="0" err="1" smtClean="0"/>
+              <a:t>achive</a:t>
+            </a:r>
+            <a:r>
+              <a:rPr lang="hu-HU" dirty="0" smtClean="0"/>
+              <a:t> OCP.</a:t>
+            </a:r>
+          </a:p>
+          <a:p>
+            <a:endParaRPr lang="hu-HU" dirty="0"/>
+          </a:p>
+          <a:p>
+            <a:r>
+              <a:rPr lang="hu-HU" dirty="0" err="1" smtClean="0"/>
+              <a:t>Remember</a:t>
+            </a:r>
+            <a:r>
+              <a:rPr lang="hu-HU" dirty="0" smtClean="0"/>
+              <a:t>:</a:t>
+            </a:r>
+          </a:p>
+          <a:p>
+            <a:r>
+              <a:rPr lang="hu-HU" dirty="0" err="1" smtClean="0"/>
+              <a:t>Thre</a:t>
+            </a:r>
+            <a:r>
+              <a:rPr lang="hu-HU" dirty="0" smtClean="0"/>
+              <a:t> </a:t>
+            </a:r>
+            <a:r>
+              <a:rPr lang="hu-HU" dirty="0" err="1" smtClean="0"/>
+              <a:t>Aint</a:t>
+            </a:r>
+            <a:r>
+              <a:rPr lang="hu-HU" dirty="0" smtClean="0"/>
+              <a:t> no </a:t>
+            </a:r>
+            <a:r>
+              <a:rPr lang="hu-HU" dirty="0" err="1" smtClean="0"/>
+              <a:t>such</a:t>
+            </a:r>
+            <a:r>
+              <a:rPr lang="hu-HU" dirty="0" smtClean="0"/>
+              <a:t> </a:t>
+            </a:r>
+            <a:r>
+              <a:rPr lang="hu-HU" dirty="0" err="1" smtClean="0"/>
+              <a:t>thing</a:t>
+            </a:r>
+            <a:r>
+              <a:rPr lang="hu-HU" dirty="0" smtClean="0"/>
+              <a:t> </a:t>
+            </a:r>
+            <a:r>
+              <a:rPr lang="hu-HU" dirty="0" err="1" smtClean="0"/>
+              <a:t>as</a:t>
+            </a:r>
+            <a:r>
+              <a:rPr lang="hu-HU" dirty="0" smtClean="0"/>
+              <a:t> a free </a:t>
+            </a:r>
+            <a:r>
+              <a:rPr lang="hu-HU" dirty="0" err="1" smtClean="0"/>
+              <a:t>lunch</a:t>
+            </a:r>
+            <a:r>
+              <a:rPr lang="hu-HU" dirty="0" smtClean="0"/>
+              <a:t>.</a:t>
+            </a:r>
+          </a:p>
+          <a:p>
+            <a:r>
+              <a:rPr lang="hu-HU" dirty="0" smtClean="0"/>
+              <a:t>OCP </a:t>
+            </a:r>
+            <a:r>
+              <a:rPr lang="hu-HU" dirty="0" err="1" smtClean="0"/>
+              <a:t>adds</a:t>
+            </a:r>
+            <a:r>
+              <a:rPr lang="hu-HU" dirty="0" smtClean="0"/>
+              <a:t> </a:t>
+            </a:r>
+            <a:r>
+              <a:rPr lang="hu-HU" dirty="0" err="1" smtClean="0"/>
+              <a:t>complexity</a:t>
+            </a:r>
+            <a:endParaRPr lang="hu-HU" dirty="0"/>
+          </a:p>
+        </p:txBody>
+      </p:sp>
+      <p:sp>
+        <p:nvSpPr>
+          <p:cNvPr id="4" name="Dia számának helye 3"/>
+          <p:cNvSpPr>
+            <a:spLocks noGrp="1"/>
+          </p:cNvSpPr>
+          <p:nvPr>
+            <p:ph type="sldNum" sz="quarter" idx="12"/>
+          </p:nvPr>
+        </p:nvSpPr>
+        <p:spPr/>
+        <p:txBody>
+          <a:bodyPr/>
+          <a:lstStyle/>
+          <a:p>
+            <a:fld id="{F28C9355-BD38-4B88-A605-51440FB067EA}" type="slidenum">
+              <a:rPr lang="hu-HU" smtClean="0"/>
+              <a:t>28</a:t>
+            </a:fld>
+            <a:endParaRPr lang="hu-HU"/>
+          </a:p>
+        </p:txBody>
+      </p:sp>
+    </p:spTree>
+    <p:extLst>
+      <p:ext uri="{BB962C8B-B14F-4D97-AF65-F5344CB8AC3E}">
+        <p14:creationId xmlns:p14="http://schemas.microsoft.com/office/powerpoint/2010/main" val="369854987"/>
       </p:ext>
     </p:extLst>
   </p:cSld>

</xml_diff>